<commit_message>
Corrected license appearance, added license info
git-svn-id: http://gforge.hl7.org/svn/fhir/trunk@175 2f0db536-2c49-4257-a3fa-e771ed206c19
</commit_message>
<xml_diff>
--- a/presentations/2012-May/201205 WGM Building with FHIR.pptx
+++ b/presentations/2012-May/201205 WGM Building with FHIR.pptx
@@ -5,7 +5,7 @@
     <p:sldMasterId id="2147483744" r:id="rId2"/>
   </p:sldMasterIdLst>
   <p:notesMasterIdLst>
-    <p:notesMasterId r:id="rId46"/>
+    <p:notesMasterId r:id="rId47"/>
   </p:notesMasterIdLst>
   <p:sldIdLst>
     <p:sldId id="270" r:id="rId3"/>
@@ -51,6 +51,7 @@
     <p:sldId id="326" r:id="rId43"/>
     <p:sldId id="327" r:id="rId44"/>
     <p:sldId id="328" r:id="rId45"/>
+    <p:sldId id="329" r:id="rId46"/>
   </p:sldIdLst>
   <p:sldSz cx="9144000" cy="6858000" type="screen4x3"/>
   <p:notesSz cx="6858000" cy="9144000"/>
@@ -259,7 +260,7 @@
             <a:fld id="{5FA7A704-9F1C-4FD3-85D1-57AF2D7FD0E8}" type="datetimeFigureOut">
               <a:rPr lang="en-US" smtClean="0"/>
               <a:pPr/>
-              <a:t>5/13/2012</a:t>
+              <a:t>5/22/2012</a:t>
             </a:fld>
             <a:endParaRPr lang="en-US" dirty="0"/>
           </a:p>
@@ -662,10 +663,9 @@
             <a:extLst/>
           </a:lstStyle>
           <a:p>
-            <a:fld id="{D80A4771-C6EF-4B99-81F4-D30BE4E017A0}" type="datetimeFigureOut">
-              <a:rPr lang="en-US" smtClean="0"/>
-              <a:pPr/>
-              <a:t>5/13/2012</a:t>
+            <a:fld id="{B142FB1B-C78A-487A-8BCD-A881541F22C2}" type="datetime1">
+              <a:rPr lang="en-US" smtClean="0"/>
+              <a:t>5/22/2012</a:t>
             </a:fld>
             <a:endParaRPr lang="en-US"/>
           </a:p>
@@ -688,6 +688,10 @@
             <a:extLst/>
           </a:lstStyle>
           <a:p>
+            <a:r>
+              <a:rPr lang="en-US" smtClean="0"/>
+              <a:t>(c) 2012 HL7 International</a:t>
+            </a:r>
             <a:endParaRPr lang="en-US"/>
           </a:p>
         </p:txBody>
@@ -864,370 +868,6 @@
 </p:sldLayout>
 </file>
 
-<file path=ppt/slideLayouts/slideLayout10.xml><?xml version="1.0" encoding="utf-8"?>
-<p:sldLayout xmlns:a="http://schemas.openxmlformats.org/drawingml/2006/main" xmlns:r="http://schemas.openxmlformats.org/officeDocument/2006/relationships" xmlns:p="http://schemas.openxmlformats.org/presentationml/2006/main" type="vertTx" preserve="1">
-  <p:cSld name="Title and Vertical Text">
-    <p:spTree>
-      <p:nvGrpSpPr>
-        <p:cNvPr id="1" name=""/>
-        <p:cNvGrpSpPr/>
-        <p:nvPr/>
-      </p:nvGrpSpPr>
-      <p:grpSpPr>
-        <a:xfrm>
-          <a:off x="0" y="0"/>
-          <a:ext cx="0" cy="0"/>
-          <a:chOff x="0" y="0"/>
-          <a:chExt cx="0" cy="0"/>
-        </a:xfrm>
-      </p:grpSpPr>
-      <p:sp>
-        <p:nvSpPr>
-          <p:cNvPr id="2" name="Title 1"/>
-          <p:cNvSpPr>
-            <a:spLocks noGrp="1"/>
-          </p:cNvSpPr>
-          <p:nvPr>
-            <p:ph type="title"/>
-          </p:nvPr>
-        </p:nvSpPr>
-        <p:spPr/>
-        <p:txBody>
-          <a:bodyPr/>
-          <a:lstStyle>
-            <a:extLst/>
-          </a:lstStyle>
-          <a:p>
-            <a:r>
-              <a:rPr lang="en-US" smtClean="0"/>
-              <a:t>Click to edit Master title style</a:t>
-            </a:r>
-            <a:endParaRPr lang="en-US"/>
-          </a:p>
-        </p:txBody>
-      </p:sp>
-      <p:sp>
-        <p:nvSpPr>
-          <p:cNvPr id="3" name="Vertical Text Placeholder 2"/>
-          <p:cNvSpPr>
-            <a:spLocks noGrp="1"/>
-          </p:cNvSpPr>
-          <p:nvPr>
-            <p:ph type="body" orient="vert" idx="1"/>
-          </p:nvPr>
-        </p:nvSpPr>
-        <p:spPr/>
-        <p:txBody>
-          <a:bodyPr vert="eaVert"/>
-          <a:lstStyle>
-            <a:extLst/>
-          </a:lstStyle>
-          <a:p>
-            <a:pPr lvl="0"/>
-            <a:r>
-              <a:rPr lang="en-US" smtClean="0"/>
-              <a:t>Click to edit Master text styles</a:t>
-            </a:r>
-          </a:p>
-          <a:p>
-            <a:pPr lvl="1"/>
-            <a:r>
-              <a:rPr lang="en-US" smtClean="0"/>
-              <a:t>Second level</a:t>
-            </a:r>
-          </a:p>
-          <a:p>
-            <a:pPr lvl="2"/>
-            <a:r>
-              <a:rPr lang="en-US" smtClean="0"/>
-              <a:t>Third level</a:t>
-            </a:r>
-          </a:p>
-          <a:p>
-            <a:pPr lvl="3"/>
-            <a:r>
-              <a:rPr lang="en-US" smtClean="0"/>
-              <a:t>Fourth level</a:t>
-            </a:r>
-          </a:p>
-          <a:p>
-            <a:pPr lvl="4"/>
-            <a:r>
-              <a:rPr lang="en-US" smtClean="0"/>
-              <a:t>Fifth level</a:t>
-            </a:r>
-            <a:endParaRPr lang="en-US"/>
-          </a:p>
-        </p:txBody>
-      </p:sp>
-      <p:sp>
-        <p:nvSpPr>
-          <p:cNvPr id="4" name="Date Placeholder 3"/>
-          <p:cNvSpPr>
-            <a:spLocks noGrp="1"/>
-          </p:cNvSpPr>
-          <p:nvPr>
-            <p:ph type="dt" sz="half" idx="10"/>
-          </p:nvPr>
-        </p:nvSpPr>
-        <p:spPr/>
-        <p:txBody>
-          <a:bodyPr/>
-          <a:lstStyle>
-            <a:extLst/>
-          </a:lstStyle>
-          <a:p>
-            <a:fld id="{D80A4771-C6EF-4B99-81F4-D30BE4E017A0}" type="datetimeFigureOut">
-              <a:rPr lang="en-US" smtClean="0"/>
-              <a:pPr/>
-              <a:t>5/13/2012</a:t>
-            </a:fld>
-            <a:endParaRPr lang="en-US"/>
-          </a:p>
-        </p:txBody>
-      </p:sp>
-      <p:sp>
-        <p:nvSpPr>
-          <p:cNvPr id="5" name="Footer Placeholder 4"/>
-          <p:cNvSpPr>
-            <a:spLocks noGrp="1"/>
-          </p:cNvSpPr>
-          <p:nvPr>
-            <p:ph type="ftr" sz="quarter" idx="11"/>
-          </p:nvPr>
-        </p:nvSpPr>
-        <p:spPr/>
-        <p:txBody>
-          <a:bodyPr/>
-          <a:lstStyle>
-            <a:extLst/>
-          </a:lstStyle>
-          <a:p>
-            <a:endParaRPr lang="en-US"/>
-          </a:p>
-        </p:txBody>
-      </p:sp>
-      <p:sp>
-        <p:nvSpPr>
-          <p:cNvPr id="6" name="Slide Number Placeholder 5"/>
-          <p:cNvSpPr>
-            <a:spLocks noGrp="1"/>
-          </p:cNvSpPr>
-          <p:nvPr>
-            <p:ph type="sldNum" sz="quarter" idx="12"/>
-          </p:nvPr>
-        </p:nvSpPr>
-        <p:spPr/>
-        <p:txBody>
-          <a:bodyPr/>
-          <a:lstStyle>
-            <a:extLst/>
-          </a:lstStyle>
-          <a:p>
-            <a:fld id="{990B41CA-569D-40E7-8E58-026C0338B2C8}" type="slidenum">
-              <a:rPr lang="en-US" smtClean="0"/>
-              <a:pPr/>
-              <a:t>‹#›</a:t>
-            </a:fld>
-            <a:endParaRPr lang="en-US"/>
-          </a:p>
-        </p:txBody>
-      </p:sp>
-    </p:spTree>
-  </p:cSld>
-  <p:clrMapOvr>
-    <a:masterClrMapping/>
-  </p:clrMapOvr>
-</p:sldLayout>
-</file>
-
-<file path=ppt/slideLayouts/slideLayout11.xml><?xml version="1.0" encoding="utf-8"?>
-<p:sldLayout xmlns:a="http://schemas.openxmlformats.org/drawingml/2006/main" xmlns:r="http://schemas.openxmlformats.org/officeDocument/2006/relationships" xmlns:p="http://schemas.openxmlformats.org/presentationml/2006/main" type="vertTitleAndTx" preserve="1">
-  <p:cSld name="Vertical Title and Text">
-    <p:spTree>
-      <p:nvGrpSpPr>
-        <p:cNvPr id="1" name=""/>
-        <p:cNvGrpSpPr/>
-        <p:nvPr/>
-      </p:nvGrpSpPr>
-      <p:grpSpPr>
-        <a:xfrm>
-          <a:off x="0" y="0"/>
-          <a:ext cx="0" cy="0"/>
-          <a:chOff x="0" y="0"/>
-          <a:chExt cx="0" cy="0"/>
-        </a:xfrm>
-      </p:grpSpPr>
-      <p:sp>
-        <p:nvSpPr>
-          <p:cNvPr id="2" name="Vertical Title 1"/>
-          <p:cNvSpPr>
-            <a:spLocks noGrp="1"/>
-          </p:cNvSpPr>
-          <p:nvPr>
-            <p:ph type="title" orient="vert"/>
-          </p:nvPr>
-        </p:nvSpPr>
-        <p:spPr>
-          <a:xfrm>
-            <a:off x="6858000" y="274639"/>
-            <a:ext cx="1828800" cy="5851525"/>
-          </a:xfrm>
-        </p:spPr>
-        <p:txBody>
-          <a:bodyPr vert="eaVert"/>
-          <a:lstStyle>
-            <a:extLst/>
-          </a:lstStyle>
-          <a:p>
-            <a:r>
-              <a:rPr lang="en-US" smtClean="0"/>
-              <a:t>Click to edit Master title style</a:t>
-            </a:r>
-            <a:endParaRPr lang="en-US"/>
-          </a:p>
-        </p:txBody>
-      </p:sp>
-      <p:sp>
-        <p:nvSpPr>
-          <p:cNvPr id="3" name="Vertical Text Placeholder 2"/>
-          <p:cNvSpPr>
-            <a:spLocks noGrp="1"/>
-          </p:cNvSpPr>
-          <p:nvPr>
-            <p:ph type="body" orient="vert" idx="1"/>
-          </p:nvPr>
-        </p:nvSpPr>
-        <p:spPr>
-          <a:xfrm>
-            <a:off x="1143000" y="274640"/>
-            <a:ext cx="5562600" cy="5851525"/>
-          </a:xfrm>
-        </p:spPr>
-        <p:txBody>
-          <a:bodyPr vert="eaVert"/>
-          <a:lstStyle>
-            <a:extLst/>
-          </a:lstStyle>
-          <a:p>
-            <a:pPr lvl="0"/>
-            <a:r>
-              <a:rPr lang="en-US" smtClean="0"/>
-              <a:t>Click to edit Master text styles</a:t>
-            </a:r>
-          </a:p>
-          <a:p>
-            <a:pPr lvl="1"/>
-            <a:r>
-              <a:rPr lang="en-US" smtClean="0"/>
-              <a:t>Second level</a:t>
-            </a:r>
-          </a:p>
-          <a:p>
-            <a:pPr lvl="2"/>
-            <a:r>
-              <a:rPr lang="en-US" smtClean="0"/>
-              <a:t>Third level</a:t>
-            </a:r>
-          </a:p>
-          <a:p>
-            <a:pPr lvl="3"/>
-            <a:r>
-              <a:rPr lang="en-US" smtClean="0"/>
-              <a:t>Fourth level</a:t>
-            </a:r>
-          </a:p>
-          <a:p>
-            <a:pPr lvl="4"/>
-            <a:r>
-              <a:rPr lang="en-US" smtClean="0"/>
-              <a:t>Fifth level</a:t>
-            </a:r>
-            <a:endParaRPr lang="en-US" dirty="0"/>
-          </a:p>
-        </p:txBody>
-      </p:sp>
-      <p:sp>
-        <p:nvSpPr>
-          <p:cNvPr id="4" name="Date Placeholder 3"/>
-          <p:cNvSpPr>
-            <a:spLocks noGrp="1"/>
-          </p:cNvSpPr>
-          <p:nvPr>
-            <p:ph type="dt" sz="half" idx="10"/>
-          </p:nvPr>
-        </p:nvSpPr>
-        <p:spPr/>
-        <p:txBody>
-          <a:bodyPr/>
-          <a:lstStyle>
-            <a:extLst/>
-          </a:lstStyle>
-          <a:p>
-            <a:fld id="{D80A4771-C6EF-4B99-81F4-D30BE4E017A0}" type="datetimeFigureOut">
-              <a:rPr lang="en-US" smtClean="0"/>
-              <a:pPr/>
-              <a:t>5/13/2012</a:t>
-            </a:fld>
-            <a:endParaRPr lang="en-US"/>
-          </a:p>
-        </p:txBody>
-      </p:sp>
-      <p:sp>
-        <p:nvSpPr>
-          <p:cNvPr id="5" name="Footer Placeholder 4"/>
-          <p:cNvSpPr>
-            <a:spLocks noGrp="1"/>
-          </p:cNvSpPr>
-          <p:nvPr>
-            <p:ph type="ftr" sz="quarter" idx="11"/>
-          </p:nvPr>
-        </p:nvSpPr>
-        <p:spPr/>
-        <p:txBody>
-          <a:bodyPr/>
-          <a:lstStyle>
-            <a:extLst/>
-          </a:lstStyle>
-          <a:p>
-            <a:endParaRPr lang="en-US"/>
-          </a:p>
-        </p:txBody>
-      </p:sp>
-      <p:sp>
-        <p:nvSpPr>
-          <p:cNvPr id="6" name="Slide Number Placeholder 5"/>
-          <p:cNvSpPr>
-            <a:spLocks noGrp="1"/>
-          </p:cNvSpPr>
-          <p:nvPr>
-            <p:ph type="sldNum" sz="quarter" idx="12"/>
-          </p:nvPr>
-        </p:nvSpPr>
-        <p:spPr/>
-        <p:txBody>
-          <a:bodyPr/>
-          <a:lstStyle>
-            <a:extLst/>
-          </a:lstStyle>
-          <a:p>
-            <a:fld id="{990B41CA-569D-40E7-8E58-026C0338B2C8}" type="slidenum">
-              <a:rPr lang="en-US" smtClean="0"/>
-              <a:pPr/>
-              <a:t>‹#›</a:t>
-            </a:fld>
-            <a:endParaRPr lang="en-US"/>
-          </a:p>
-        </p:txBody>
-      </p:sp>
-    </p:spTree>
-  </p:cSld>
-  <p:clrMapOvr>
-    <a:masterClrMapping/>
-  </p:clrMapOvr>
-</p:sldLayout>
-</file>
-
 <file path=ppt/slideLayouts/slideLayout2.xml><?xml version="1.0" encoding="utf-8"?>
 <p:sldLayout xmlns:a="http://schemas.openxmlformats.org/drawingml/2006/main" xmlns:r="http://schemas.openxmlformats.org/officeDocument/2006/relationships" xmlns:p="http://schemas.openxmlformats.org/presentationml/2006/main" type="obj" preserve="1">
   <p:cSld name="Title and Content">
@@ -1362,10 +1002,9 @@
             <a:extLst/>
           </a:lstStyle>
           <a:p>
-            <a:fld id="{D80A4771-C6EF-4B99-81F4-D30BE4E017A0}" type="datetimeFigureOut">
-              <a:rPr lang="en-US" smtClean="0"/>
-              <a:pPr/>
-              <a:t>5/13/2012</a:t>
+            <a:fld id="{A21CDED8-F563-489F-88EF-1064F78DA1BE}" type="datetime1">
+              <a:rPr lang="en-US" smtClean="0"/>
+              <a:t>5/22/2012</a:t>
             </a:fld>
             <a:endParaRPr lang="en-US"/>
           </a:p>
@@ -1393,6 +1032,10 @@
             <a:extLst/>
           </a:lstStyle>
           <a:p>
+            <a:r>
+              <a:rPr lang="en-US" smtClean="0"/>
+              <a:t>(c) 2012 HL7 International</a:t>
+            </a:r>
             <a:endParaRPr lang="en-US" dirty="0"/>
           </a:p>
         </p:txBody>
@@ -1642,10 +1285,9 @@
             <a:extLst/>
           </a:lstStyle>
           <a:p>
-            <a:fld id="{D80A4771-C6EF-4B99-81F4-D30BE4E017A0}" type="datetimeFigureOut">
-              <a:rPr lang="en-US" smtClean="0"/>
-              <a:pPr/>
-              <a:t>5/13/2012</a:t>
+            <a:fld id="{FD30C353-CC25-4A0A-BB33-6D6BD2593260}" type="datetime1">
+              <a:rPr lang="en-US" smtClean="0"/>
+              <a:t>5/22/2012</a:t>
             </a:fld>
             <a:endParaRPr lang="en-US"/>
           </a:p>
@@ -1668,6 +1310,10 @@
             <a:extLst/>
           </a:lstStyle>
           <a:p>
+            <a:r>
+              <a:rPr lang="en-US" smtClean="0"/>
+              <a:t>(c) 2012 HL7 International</a:t>
+            </a:r>
             <a:endParaRPr lang="en-US"/>
           </a:p>
         </p:txBody>
@@ -1902,6 +1548,36 @@
           </a:prstGeom>
         </p:spPr>
       </p:pic>
+      <p:pic>
+        <p:nvPicPr>
+          <p:cNvPr id="13" name="Picture 12"/>
+          <p:cNvPicPr>
+            <a:picLocks noChangeAspect="1"/>
+          </p:cNvPicPr>
+          <p:nvPr userDrawn="1"/>
+        </p:nvPicPr>
+        <p:blipFill>
+          <a:blip r:embed="rId3">
+            <a:extLst>
+              <a:ext uri="{28A0092B-C50C-407E-A947-70E740481C1C}">
+                <a14:useLocalDpi xmlns:a14="http://schemas.microsoft.com/office/drawing/2010/main" val="0"/>
+              </a:ext>
+            </a:extLst>
+          </a:blip>
+          <a:stretch>
+            <a:fillRect/>
+          </a:stretch>
+        </p:blipFill>
+        <p:spPr>
+          <a:xfrm>
+            <a:off x="7812360" y="6591625"/>
+            <a:ext cx="762000" cy="142875"/>
+          </a:xfrm>
+          <a:prstGeom prst="rect">
+            <a:avLst/>
+          </a:prstGeom>
+        </p:spPr>
+      </p:pic>
     </p:spTree>
   </p:cSld>
   <p:clrMapOvr>
@@ -2178,10 +1854,9 @@
             <a:extLst/>
           </a:lstStyle>
           <a:p>
-            <a:fld id="{D80A4771-C6EF-4B99-81F4-D30BE4E017A0}" type="datetimeFigureOut">
-              <a:rPr lang="en-US" smtClean="0"/>
-              <a:pPr/>
-              <a:t>5/13/2012</a:t>
+            <a:fld id="{66975E8D-6B47-4E8D-91C9-35A37ADF04B9}" type="datetime1">
+              <a:rPr lang="en-US" smtClean="0"/>
+              <a:t>5/22/2012</a:t>
             </a:fld>
             <a:endParaRPr lang="en-US"/>
           </a:p>
@@ -2204,6 +1879,10 @@
             <a:extLst/>
           </a:lstStyle>
           <a:p>
+            <a:r>
+              <a:rPr lang="en-US" smtClean="0"/>
+              <a:t>(c) 2012 HL7 International</a:t>
+            </a:r>
             <a:endParaRPr lang="en-US"/>
           </a:p>
         </p:txBody>
@@ -2382,6 +2061,36 @@
           </a:p>
         </p:txBody>
       </p:sp>
+      <p:pic>
+        <p:nvPicPr>
+          <p:cNvPr id="11" name="Picture 10"/>
+          <p:cNvPicPr>
+            <a:picLocks noChangeAspect="1"/>
+          </p:cNvPicPr>
+          <p:nvPr userDrawn="1"/>
+        </p:nvPicPr>
+        <p:blipFill>
+          <a:blip r:embed="rId3">
+            <a:extLst>
+              <a:ext uri="{28A0092B-C50C-407E-A947-70E740481C1C}">
+                <a14:useLocalDpi xmlns:a14="http://schemas.microsoft.com/office/drawing/2010/main" val="0"/>
+              </a:ext>
+            </a:extLst>
+          </a:blip>
+          <a:stretch>
+            <a:fillRect/>
+          </a:stretch>
+        </p:blipFill>
+        <p:spPr>
+          <a:xfrm>
+            <a:off x="7812360" y="6591625"/>
+            <a:ext cx="762000" cy="142875"/>
+          </a:xfrm>
+          <a:prstGeom prst="rect">
+            <a:avLst/>
+          </a:prstGeom>
+        </p:spPr>
+      </p:pic>
     </p:spTree>
   </p:cSld>
   <p:clrMapOvr>
@@ -2817,10 +2526,9 @@
             <a:extLst/>
           </a:lstStyle>
           <a:p>
-            <a:fld id="{D80A4771-C6EF-4B99-81F4-D30BE4E017A0}" type="datetimeFigureOut">
-              <a:rPr lang="en-US" smtClean="0"/>
-              <a:pPr/>
-              <a:t>5/13/2012</a:t>
+            <a:fld id="{17893065-8A64-4F22-9915-FF4382408924}" type="datetime1">
+              <a:rPr lang="en-US" smtClean="0"/>
+              <a:t>5/22/2012</a:t>
             </a:fld>
             <a:endParaRPr lang="en-US"/>
           </a:p>
@@ -2843,6 +2551,10 @@
             <a:extLst/>
           </a:lstStyle>
           <a:p>
+            <a:r>
+              <a:rPr lang="en-US" smtClean="0"/>
+              <a:t>(c) 2012 HL7 International</a:t>
+            </a:r>
             <a:endParaRPr lang="en-US"/>
           </a:p>
         </p:txBody>
@@ -2873,6 +2585,36 @@
           </a:p>
         </p:txBody>
       </p:sp>
+      <p:pic>
+        <p:nvPicPr>
+          <p:cNvPr id="10" name="Picture 9"/>
+          <p:cNvPicPr>
+            <a:picLocks noChangeAspect="1"/>
+          </p:cNvPicPr>
+          <p:nvPr userDrawn="1"/>
+        </p:nvPicPr>
+        <p:blipFill>
+          <a:blip r:embed="rId2">
+            <a:extLst>
+              <a:ext uri="{28A0092B-C50C-407E-A947-70E740481C1C}">
+                <a14:useLocalDpi xmlns:a14="http://schemas.microsoft.com/office/drawing/2010/main" val="0"/>
+              </a:ext>
+            </a:extLst>
+          </a:blip>
+          <a:stretch>
+            <a:fillRect/>
+          </a:stretch>
+        </p:blipFill>
+        <p:spPr>
+          <a:xfrm>
+            <a:off x="7812360" y="6591625"/>
+            <a:ext cx="762000" cy="142875"/>
+          </a:xfrm>
+          <a:prstGeom prst="rect">
+            <a:avLst/>
+          </a:prstGeom>
+        </p:spPr>
+      </p:pic>
     </p:spTree>
   </p:cSld>
   <p:clrMapOvr>
@@ -2945,10 +2687,9 @@
             <a:extLst/>
           </a:lstStyle>
           <a:p>
-            <a:fld id="{D80A4771-C6EF-4B99-81F4-D30BE4E017A0}" type="datetimeFigureOut">
-              <a:rPr lang="en-US" smtClean="0"/>
-              <a:pPr/>
-              <a:t>5/13/2012</a:t>
+            <a:fld id="{CB114365-E42C-4748-B650-E05E6796E814}" type="datetime1">
+              <a:rPr lang="en-US" smtClean="0"/>
+              <a:t>5/22/2012</a:t>
             </a:fld>
             <a:endParaRPr lang="en-US"/>
           </a:p>
@@ -2971,6 +2712,10 @@
             <a:extLst/>
           </a:lstStyle>
           <a:p>
+            <a:r>
+              <a:rPr lang="en-US" smtClean="0"/>
+              <a:t>(c) 2012 HL7 International</a:t>
+            </a:r>
             <a:endParaRPr lang="en-US"/>
           </a:p>
         </p:txBody>
@@ -3091,10 +2836,9 @@
             <a:extLst/>
           </a:lstStyle>
           <a:p>
-            <a:fld id="{D80A4771-C6EF-4B99-81F4-D30BE4E017A0}" type="datetimeFigureOut">
-              <a:rPr lang="en-US" smtClean="0"/>
-              <a:pPr/>
-              <a:t>5/13/2012</a:t>
+            <a:fld id="{3DE4F72A-80B0-44A0-B9F0-C4EAF3918D0F}" type="datetime1">
+              <a:rPr lang="en-US" smtClean="0"/>
+              <a:t>5/22/2012</a:t>
             </a:fld>
             <a:endParaRPr lang="en-US"/>
           </a:p>
@@ -3117,6 +2861,10 @@
             <a:extLst/>
           </a:lstStyle>
           <a:p>
+            <a:r>
+              <a:rPr lang="en-US" smtClean="0"/>
+              <a:t>(c) 2012 HL7 International</a:t>
+            </a:r>
             <a:endParaRPr lang="en-US"/>
           </a:p>
         </p:txBody>
@@ -3351,6 +3099,36 @@
           </a:p>
         </p:txBody>
       </p:sp>
+      <p:pic>
+        <p:nvPicPr>
+          <p:cNvPr id="9" name="Picture 8"/>
+          <p:cNvPicPr>
+            <a:picLocks noChangeAspect="1"/>
+          </p:cNvPicPr>
+          <p:nvPr userDrawn="1"/>
+        </p:nvPicPr>
+        <p:blipFill>
+          <a:blip r:embed="rId3">
+            <a:extLst>
+              <a:ext uri="{28A0092B-C50C-407E-A947-70E740481C1C}">
+                <a14:useLocalDpi xmlns:a14="http://schemas.microsoft.com/office/drawing/2010/main" val="0"/>
+              </a:ext>
+            </a:extLst>
+          </a:blip>
+          <a:stretch>
+            <a:fillRect/>
+          </a:stretch>
+        </p:blipFill>
+        <p:spPr>
+          <a:xfrm>
+            <a:off x="7812360" y="6591625"/>
+            <a:ext cx="762000" cy="142875"/>
+          </a:xfrm>
+          <a:prstGeom prst="rect">
+            <a:avLst/>
+          </a:prstGeom>
+        </p:spPr>
+      </p:pic>
     </p:spTree>
   </p:cSld>
   <p:clrMapOvr>
@@ -3438,10 +3216,9 @@
             <a:extLst/>
           </a:lstStyle>
           <a:p>
-            <a:fld id="{D80A4771-C6EF-4B99-81F4-D30BE4E017A0}" type="datetimeFigureOut">
-              <a:rPr lang="en-US" smtClean="0"/>
-              <a:pPr/>
-              <a:t>5/13/2012</a:t>
+            <a:fld id="{31312CF5-3C3D-46C2-B622-B5133F51A02F}" type="datetime1">
+              <a:rPr lang="en-US" smtClean="0"/>
+              <a:t>5/22/2012</a:t>
             </a:fld>
             <a:endParaRPr lang="en-US"/>
           </a:p>
@@ -3464,6 +3241,10 @@
             <a:extLst/>
           </a:lstStyle>
           <a:p>
+            <a:r>
+              <a:rPr lang="en-US" smtClean="0"/>
+              <a:t>(c) 2012 HL7 International</a:t>
+            </a:r>
             <a:endParaRPr lang="en-US"/>
           </a:p>
         </p:txBody>
@@ -3494,6 +3275,36 @@
           </a:p>
         </p:txBody>
       </p:sp>
+      <p:pic>
+        <p:nvPicPr>
+          <p:cNvPr id="8" name="Picture 7"/>
+          <p:cNvPicPr>
+            <a:picLocks noChangeAspect="1"/>
+          </p:cNvPicPr>
+          <p:nvPr userDrawn="1"/>
+        </p:nvPicPr>
+        <p:blipFill>
+          <a:blip r:embed="rId2">
+            <a:extLst>
+              <a:ext uri="{28A0092B-C50C-407E-A947-70E740481C1C}">
+                <a14:useLocalDpi xmlns:a14="http://schemas.microsoft.com/office/drawing/2010/main" val="0"/>
+              </a:ext>
+            </a:extLst>
+          </a:blip>
+          <a:stretch>
+            <a:fillRect/>
+          </a:stretch>
+        </p:blipFill>
+        <p:spPr>
+          <a:xfrm>
+            <a:off x="7812360" y="6591625"/>
+            <a:ext cx="762000" cy="142875"/>
+          </a:xfrm>
+          <a:prstGeom prst="rect">
+            <a:avLst/>
+          </a:prstGeom>
+        </p:spPr>
+      </p:pic>
     </p:spTree>
   </p:cSld>
   <p:clrMapOvr>
@@ -3536,10 +3347,9 @@
             <a:extLst/>
           </a:lstStyle>
           <a:p>
-            <a:fld id="{D80A4771-C6EF-4B99-81F4-D30BE4E017A0}" type="datetimeFigureOut">
-              <a:rPr lang="en-US" smtClean="0"/>
-              <a:pPr/>
-              <a:t>5/13/2012</a:t>
+            <a:fld id="{1B6975F4-4FFA-4A1F-95BD-5803C6F2FE7C}" type="datetime1">
+              <a:rPr lang="en-US" smtClean="0"/>
+              <a:t>5/22/2012</a:t>
             </a:fld>
             <a:endParaRPr lang="en-US"/>
           </a:p>
@@ -3562,6 +3372,10 @@
             <a:extLst/>
           </a:lstStyle>
           <a:p>
+            <a:r>
+              <a:rPr lang="en-US" smtClean="0"/>
+              <a:t>(c) 2012 HL7 International</a:t>
+            </a:r>
             <a:endParaRPr lang="en-US"/>
           </a:p>
         </p:txBody>
@@ -3740,6 +3554,36 @@
           </a:p>
         </p:txBody>
       </p:sp>
+      <p:pic>
+        <p:nvPicPr>
+          <p:cNvPr id="8" name="Picture 7"/>
+          <p:cNvPicPr>
+            <a:picLocks noChangeAspect="1"/>
+          </p:cNvPicPr>
+          <p:nvPr userDrawn="1"/>
+        </p:nvPicPr>
+        <p:blipFill>
+          <a:blip r:embed="rId3">
+            <a:extLst>
+              <a:ext uri="{28A0092B-C50C-407E-A947-70E740481C1C}">
+                <a14:useLocalDpi xmlns:a14="http://schemas.microsoft.com/office/drawing/2010/main" val="0"/>
+              </a:ext>
+            </a:extLst>
+          </a:blip>
+          <a:stretch>
+            <a:fillRect/>
+          </a:stretch>
+        </p:blipFill>
+        <p:spPr>
+          <a:xfrm>
+            <a:off x="7812360" y="6591625"/>
+            <a:ext cx="762000" cy="142875"/>
+          </a:xfrm>
+          <a:prstGeom prst="rect">
+            <a:avLst/>
+          </a:prstGeom>
+        </p:spPr>
+      </p:pic>
     </p:spTree>
   </p:cSld>
   <p:clrMapOvr>
@@ -3754,12 +3598,12 @@
     <p:bg>
       <p:bgPr>
         <a:blipFill dpi="0" rotWithShape="1">
-          <a:blip r:embed="rId13">
+          <a:blip r:embed="rId11">
             <a:lum/>
           </a:blip>
           <a:srcRect/>
           <a:stretch>
-            <a:fillRect t="-17000" b="-17000"/>
+            <a:fillRect l="-7000" r="-7000"/>
           </a:stretch>
         </a:blipFill>
         <a:effectLst/>
@@ -3962,10 +3806,9 @@
           </a:lstStyle>
           <a:p>
             <a:pPr algn="r"/>
-            <a:fld id="{D80A4771-C6EF-4B99-81F4-D30BE4E017A0}" type="datetimeFigureOut">
-              <a:rPr lang="en-US" smtClean="0"/>
-              <a:pPr algn="r"/>
-              <a:t>5/13/2012</a:t>
+            <a:fld id="{8C06AFE6-806B-4C7D-8B17-59A8EDC774EA}" type="datetime1">
+              <a:rPr lang="en-US" smtClean="0"/>
+              <a:t>5/22/2012</a:t>
             </a:fld>
             <a:endParaRPr lang="en-US" sz="1200">
               <a:solidFill>
@@ -4013,6 +3856,17 @@
             <a:extLst/>
           </a:lstStyle>
           <a:p>
+            <a:r>
+              <a:rPr lang="en-US" sz="1200" smtClean="0">
+                <a:solidFill>
+                  <a:schemeClr val="bg2">
+                    <a:shade val="50000"/>
+                  </a:schemeClr>
+                </a:solidFill>
+                <a:effectLst/>
+              </a:rPr>
+              <a:t>(c) 2012 HL7 International</a:t>
+            </a:r>
             <a:endParaRPr lang="en-US" sz="1200">
               <a:solidFill>
                 <a:schemeClr val="bg2">
@@ -4142,7 +3996,7 @@
           <p:nvPr userDrawn="1"/>
         </p:nvPicPr>
         <p:blipFill>
-          <a:blip r:embed="rId14" cstate="print">
+          <a:blip r:embed="rId12" cstate="print">
             <a:extLst>
               <a:ext uri="{28A0092B-C50C-407E-A947-70E740481C1C}">
                 <a14:useLocalDpi xmlns:a14="http://schemas.microsoft.com/office/drawing/2010/main" val="0"/>
@@ -4281,6 +4135,36 @@
           </a:p>
         </p:txBody>
       </p:sp>
+      <p:pic>
+        <p:nvPicPr>
+          <p:cNvPr id="11" name="Picture 10"/>
+          <p:cNvPicPr>
+            <a:picLocks noChangeAspect="1"/>
+          </p:cNvPicPr>
+          <p:nvPr userDrawn="1"/>
+        </p:nvPicPr>
+        <p:blipFill>
+          <a:blip r:embed="rId13">
+            <a:extLst>
+              <a:ext uri="{28A0092B-C50C-407E-A947-70E740481C1C}">
+                <a14:useLocalDpi xmlns:a14="http://schemas.microsoft.com/office/drawing/2010/main" val="0"/>
+              </a:ext>
+            </a:extLst>
+          </a:blip>
+          <a:stretch>
+            <a:fillRect/>
+          </a:stretch>
+        </p:blipFill>
+        <p:spPr>
+          <a:xfrm>
+            <a:off x="7812360" y="6591625"/>
+            <a:ext cx="762000" cy="142875"/>
+          </a:xfrm>
+          <a:prstGeom prst="rect">
+            <a:avLst/>
+          </a:prstGeom>
+        </p:spPr>
+      </p:pic>
     </p:spTree>
   </p:cSld>
   <p:clrMap bg1="lt1" tx1="dk1" bg2="lt2" tx2="dk2" accent1="accent1" accent2="accent2" accent3="accent3" accent4="accent4" accent5="accent5" accent6="accent6" hlink="hlink" folHlink="folHlink"/>
@@ -4294,9 +4178,8 @@
     <p:sldLayoutId id="2147483751" r:id="rId7"/>
     <p:sldLayoutId id="2147483752" r:id="rId8"/>
     <p:sldLayoutId id="2147483753" r:id="rId9"/>
-    <p:sldLayoutId id="2147483754" r:id="rId10"/>
-    <p:sldLayoutId id="2147483755" r:id="rId11"/>
   </p:sldLayoutIdLst>
+  <p:hf hdr="0"/>
   <p:txStyles>
     <p:titleStyle>
       <a:lvl1pPr algn="l" rtl="0" eaLnBrk="1" latinLnBrk="0" hangingPunct="1">
@@ -4894,6 +4777,76 @@
           </a:p>
         </p:txBody>
       </p:sp>
+      <p:sp>
+        <p:nvSpPr>
+          <p:cNvPr id="2" name="Date Placeholder 1"/>
+          <p:cNvSpPr>
+            <a:spLocks noGrp="1"/>
+          </p:cNvSpPr>
+          <p:nvPr>
+            <p:ph type="dt" sz="half" idx="10"/>
+          </p:nvPr>
+        </p:nvSpPr>
+        <p:spPr/>
+        <p:txBody>
+          <a:bodyPr/>
+          <a:lstStyle/>
+          <a:p>
+            <a:fld id="{57AF979C-BEF5-4C2E-8817-10BC4A2C2C57}" type="datetime1">
+              <a:rPr lang="en-US" smtClean="0"/>
+              <a:t>5/22/2012</a:t>
+            </a:fld>
+            <a:endParaRPr lang="en-US"/>
+          </a:p>
+        </p:txBody>
+      </p:sp>
+      <p:sp>
+        <p:nvSpPr>
+          <p:cNvPr id="3" name="Footer Placeholder 2"/>
+          <p:cNvSpPr>
+            <a:spLocks noGrp="1"/>
+          </p:cNvSpPr>
+          <p:nvPr>
+            <p:ph type="ftr" sz="quarter" idx="11"/>
+          </p:nvPr>
+        </p:nvSpPr>
+        <p:spPr/>
+        <p:txBody>
+          <a:bodyPr/>
+          <a:lstStyle/>
+          <a:p>
+            <a:r>
+              <a:rPr lang="en-US" smtClean="0"/>
+              <a:t>(c) 2012 HL7 International</a:t>
+            </a:r>
+            <a:endParaRPr lang="en-US"/>
+          </a:p>
+        </p:txBody>
+      </p:sp>
+      <p:sp>
+        <p:nvSpPr>
+          <p:cNvPr id="7" name="Slide Number Placeholder 6"/>
+          <p:cNvSpPr>
+            <a:spLocks noGrp="1"/>
+          </p:cNvSpPr>
+          <p:nvPr>
+            <p:ph type="sldNum" sz="quarter" idx="12"/>
+          </p:nvPr>
+        </p:nvSpPr>
+        <p:spPr/>
+        <p:txBody>
+          <a:bodyPr/>
+          <a:lstStyle/>
+          <a:p>
+            <a:fld id="{990B41CA-569D-40E7-8E58-026C0338B2C8}" type="slidenum">
+              <a:rPr lang="en-US" smtClean="0"/>
+              <a:pPr/>
+              <a:t>1</a:t>
+            </a:fld>
+            <a:endParaRPr lang="en-US"/>
+          </a:p>
+        </p:txBody>
+      </p:sp>
     </p:spTree>
     <p:extLst>
       <p:ext uri="{BB962C8B-B14F-4D97-AF65-F5344CB8AC3E}">
@@ -4947,6 +4900,76 @@
           </a:p>
         </p:txBody>
       </p:sp>
+      <p:sp>
+        <p:nvSpPr>
+          <p:cNvPr id="2" name="Date Placeholder 1"/>
+          <p:cNvSpPr>
+            <a:spLocks noGrp="1"/>
+          </p:cNvSpPr>
+          <p:nvPr>
+            <p:ph type="dt" sz="half" idx="10"/>
+          </p:nvPr>
+        </p:nvSpPr>
+        <p:spPr/>
+        <p:txBody>
+          <a:bodyPr/>
+          <a:lstStyle/>
+          <a:p>
+            <a:fld id="{F1A3489B-B294-4EC3-A192-F66C282D9322}" type="datetime1">
+              <a:rPr lang="en-US" smtClean="0"/>
+              <a:t>5/22/2012</a:t>
+            </a:fld>
+            <a:endParaRPr lang="en-US"/>
+          </a:p>
+        </p:txBody>
+      </p:sp>
+      <p:sp>
+        <p:nvSpPr>
+          <p:cNvPr id="3" name="Footer Placeholder 2"/>
+          <p:cNvSpPr>
+            <a:spLocks noGrp="1"/>
+          </p:cNvSpPr>
+          <p:nvPr>
+            <p:ph type="ftr" sz="quarter" idx="11"/>
+          </p:nvPr>
+        </p:nvSpPr>
+        <p:spPr/>
+        <p:txBody>
+          <a:bodyPr/>
+          <a:lstStyle/>
+          <a:p>
+            <a:r>
+              <a:rPr lang="en-US" smtClean="0"/>
+              <a:t>(c) 2012 HL7 International</a:t>
+            </a:r>
+            <a:endParaRPr lang="en-US"/>
+          </a:p>
+        </p:txBody>
+      </p:sp>
+      <p:sp>
+        <p:nvSpPr>
+          <p:cNvPr id="4" name="Slide Number Placeholder 3"/>
+          <p:cNvSpPr>
+            <a:spLocks noGrp="1"/>
+          </p:cNvSpPr>
+          <p:nvPr>
+            <p:ph type="sldNum" sz="quarter" idx="12"/>
+          </p:nvPr>
+        </p:nvSpPr>
+        <p:spPr/>
+        <p:txBody>
+          <a:bodyPr/>
+          <a:lstStyle/>
+          <a:p>
+            <a:fld id="{990B41CA-569D-40E7-8E58-026C0338B2C8}" type="slidenum">
+              <a:rPr lang="en-US" smtClean="0"/>
+              <a:pPr/>
+              <a:t>10</a:t>
+            </a:fld>
+            <a:endParaRPr lang="en-US"/>
+          </a:p>
+        </p:txBody>
+      </p:sp>
     </p:spTree>
     <p:extLst>
       <p:ext uri="{BB962C8B-B14F-4D97-AF65-F5344CB8AC3E}">
@@ -5129,6 +5152,76 @@
               <a:t>gforge.hl7.org/svn/fhir/trunk/source/[resourceName]</a:t>
             </a:r>
             <a:endParaRPr lang="en-CA" sz="2000" dirty="0" smtClean="0"/>
+          </a:p>
+        </p:txBody>
+      </p:sp>
+      <p:sp>
+        <p:nvSpPr>
+          <p:cNvPr id="4" name="Date Placeholder 3"/>
+          <p:cNvSpPr>
+            <a:spLocks noGrp="1"/>
+          </p:cNvSpPr>
+          <p:nvPr>
+            <p:ph type="dt" sz="half" idx="10"/>
+          </p:nvPr>
+        </p:nvSpPr>
+        <p:spPr/>
+        <p:txBody>
+          <a:bodyPr/>
+          <a:lstStyle/>
+          <a:p>
+            <a:fld id="{EA5AED1D-85F8-4CFE-BBB5-375A16973474}" type="datetime1">
+              <a:rPr lang="en-US" smtClean="0"/>
+              <a:t>5/22/2012</a:t>
+            </a:fld>
+            <a:endParaRPr lang="en-US"/>
+          </a:p>
+        </p:txBody>
+      </p:sp>
+      <p:sp>
+        <p:nvSpPr>
+          <p:cNvPr id="5" name="Footer Placeholder 4"/>
+          <p:cNvSpPr>
+            <a:spLocks noGrp="1"/>
+          </p:cNvSpPr>
+          <p:nvPr>
+            <p:ph type="ftr" sz="quarter" idx="11"/>
+          </p:nvPr>
+        </p:nvSpPr>
+        <p:spPr/>
+        <p:txBody>
+          <a:bodyPr/>
+          <a:lstStyle/>
+          <a:p>
+            <a:r>
+              <a:rPr lang="en-US" smtClean="0"/>
+              <a:t>(c) 2012 HL7 International</a:t>
+            </a:r>
+            <a:endParaRPr lang="en-US" dirty="0"/>
+          </a:p>
+        </p:txBody>
+      </p:sp>
+      <p:sp>
+        <p:nvSpPr>
+          <p:cNvPr id="6" name="Slide Number Placeholder 5"/>
+          <p:cNvSpPr>
+            <a:spLocks noGrp="1"/>
+          </p:cNvSpPr>
+          <p:nvPr>
+            <p:ph type="sldNum" sz="quarter" idx="12"/>
+          </p:nvPr>
+        </p:nvSpPr>
+        <p:spPr/>
+        <p:txBody>
+          <a:bodyPr/>
+          <a:lstStyle/>
+          <a:p>
+            <a:fld id="{990B41CA-569D-40E7-8E58-026C0338B2C8}" type="slidenum">
+              <a:rPr lang="en-US" smtClean="0"/>
+              <a:pPr/>
+              <a:t>11</a:t>
+            </a:fld>
+            <a:endParaRPr lang="en-US"/>
           </a:p>
         </p:txBody>
       </p:sp>
@@ -5295,6 +5388,76 @@
           </a:p>
         </p:txBody>
       </p:sp>
+      <p:sp>
+        <p:nvSpPr>
+          <p:cNvPr id="3" name="Date Placeholder 2"/>
+          <p:cNvSpPr>
+            <a:spLocks noGrp="1"/>
+          </p:cNvSpPr>
+          <p:nvPr>
+            <p:ph type="dt" sz="half" idx="10"/>
+          </p:nvPr>
+        </p:nvSpPr>
+        <p:spPr/>
+        <p:txBody>
+          <a:bodyPr/>
+          <a:lstStyle/>
+          <a:p>
+            <a:fld id="{8720406C-FB20-42D4-B706-F3127D5B1000}" type="datetime1">
+              <a:rPr lang="en-US" smtClean="0"/>
+              <a:t>5/22/2012</a:t>
+            </a:fld>
+            <a:endParaRPr lang="en-US"/>
+          </a:p>
+        </p:txBody>
+      </p:sp>
+      <p:sp>
+        <p:nvSpPr>
+          <p:cNvPr id="5" name="Footer Placeholder 4"/>
+          <p:cNvSpPr>
+            <a:spLocks noGrp="1"/>
+          </p:cNvSpPr>
+          <p:nvPr>
+            <p:ph type="ftr" sz="quarter" idx="11"/>
+          </p:nvPr>
+        </p:nvSpPr>
+        <p:spPr/>
+        <p:txBody>
+          <a:bodyPr/>
+          <a:lstStyle/>
+          <a:p>
+            <a:r>
+              <a:rPr lang="en-US" smtClean="0"/>
+              <a:t>(c) 2012 HL7 International</a:t>
+            </a:r>
+            <a:endParaRPr lang="en-US" dirty="0"/>
+          </a:p>
+        </p:txBody>
+      </p:sp>
+      <p:sp>
+        <p:nvSpPr>
+          <p:cNvPr id="6" name="Slide Number Placeholder 5"/>
+          <p:cNvSpPr>
+            <a:spLocks noGrp="1"/>
+          </p:cNvSpPr>
+          <p:nvPr>
+            <p:ph type="sldNum" sz="quarter" idx="12"/>
+          </p:nvPr>
+        </p:nvSpPr>
+        <p:spPr/>
+        <p:txBody>
+          <a:bodyPr/>
+          <a:lstStyle/>
+          <a:p>
+            <a:fld id="{990B41CA-569D-40E7-8E58-026C0338B2C8}" type="slidenum">
+              <a:rPr lang="en-US" smtClean="0"/>
+              <a:pPr/>
+              <a:t>12</a:t>
+            </a:fld>
+            <a:endParaRPr lang="en-US"/>
+          </a:p>
+        </p:txBody>
+      </p:sp>
     </p:spTree>
     <p:extLst>
       <p:ext uri="{BB962C8B-B14F-4D97-AF65-F5344CB8AC3E}">
@@ -5414,6 +5577,76 @@
           </a:extLst>
         </p:spPr>
       </p:pic>
+      <p:sp>
+        <p:nvSpPr>
+          <p:cNvPr id="3" name="Date Placeholder 2"/>
+          <p:cNvSpPr>
+            <a:spLocks noGrp="1"/>
+          </p:cNvSpPr>
+          <p:nvPr>
+            <p:ph type="dt" sz="half" idx="10"/>
+          </p:nvPr>
+        </p:nvSpPr>
+        <p:spPr/>
+        <p:txBody>
+          <a:bodyPr/>
+          <a:lstStyle/>
+          <a:p>
+            <a:fld id="{40467707-729D-440B-BC27-179C1B85AC1C}" type="datetime1">
+              <a:rPr lang="en-US" smtClean="0"/>
+              <a:t>5/22/2012</a:t>
+            </a:fld>
+            <a:endParaRPr lang="en-US"/>
+          </a:p>
+        </p:txBody>
+      </p:sp>
+      <p:sp>
+        <p:nvSpPr>
+          <p:cNvPr id="4" name="Footer Placeholder 3"/>
+          <p:cNvSpPr>
+            <a:spLocks noGrp="1"/>
+          </p:cNvSpPr>
+          <p:nvPr>
+            <p:ph type="ftr" sz="quarter" idx="11"/>
+          </p:nvPr>
+        </p:nvSpPr>
+        <p:spPr/>
+        <p:txBody>
+          <a:bodyPr/>
+          <a:lstStyle/>
+          <a:p>
+            <a:r>
+              <a:rPr lang="en-US" smtClean="0"/>
+              <a:t>(c) 2012 HL7 International</a:t>
+            </a:r>
+            <a:endParaRPr lang="en-US" dirty="0"/>
+          </a:p>
+        </p:txBody>
+      </p:sp>
+      <p:sp>
+        <p:nvSpPr>
+          <p:cNvPr id="5" name="Slide Number Placeholder 4"/>
+          <p:cNvSpPr>
+            <a:spLocks noGrp="1"/>
+          </p:cNvSpPr>
+          <p:nvPr>
+            <p:ph type="sldNum" sz="quarter" idx="12"/>
+          </p:nvPr>
+        </p:nvSpPr>
+        <p:spPr/>
+        <p:txBody>
+          <a:bodyPr/>
+          <a:lstStyle/>
+          <a:p>
+            <a:fld id="{990B41CA-569D-40E7-8E58-026C0338B2C8}" type="slidenum">
+              <a:rPr lang="en-US" smtClean="0"/>
+              <a:pPr/>
+              <a:t>13</a:t>
+            </a:fld>
+            <a:endParaRPr lang="en-US"/>
+          </a:p>
+        </p:txBody>
+      </p:sp>
     </p:spTree>
     <p:extLst>
       <p:ext uri="{BB962C8B-B14F-4D97-AF65-F5344CB8AC3E}">
@@ -5533,6 +5766,76 @@
           </a:extLst>
         </p:spPr>
       </p:pic>
+      <p:sp>
+        <p:nvSpPr>
+          <p:cNvPr id="3" name="Date Placeholder 2"/>
+          <p:cNvSpPr>
+            <a:spLocks noGrp="1"/>
+          </p:cNvSpPr>
+          <p:nvPr>
+            <p:ph type="dt" sz="half" idx="10"/>
+          </p:nvPr>
+        </p:nvSpPr>
+        <p:spPr/>
+        <p:txBody>
+          <a:bodyPr/>
+          <a:lstStyle/>
+          <a:p>
+            <a:fld id="{08D354E5-DE63-4C00-85FD-10CB82A5D7D6}" type="datetime1">
+              <a:rPr lang="en-US" smtClean="0"/>
+              <a:t>5/22/2012</a:t>
+            </a:fld>
+            <a:endParaRPr lang="en-US"/>
+          </a:p>
+        </p:txBody>
+      </p:sp>
+      <p:sp>
+        <p:nvSpPr>
+          <p:cNvPr id="4" name="Footer Placeholder 3"/>
+          <p:cNvSpPr>
+            <a:spLocks noGrp="1"/>
+          </p:cNvSpPr>
+          <p:nvPr>
+            <p:ph type="ftr" sz="quarter" idx="11"/>
+          </p:nvPr>
+        </p:nvSpPr>
+        <p:spPr/>
+        <p:txBody>
+          <a:bodyPr/>
+          <a:lstStyle/>
+          <a:p>
+            <a:r>
+              <a:rPr lang="en-US" smtClean="0"/>
+              <a:t>(c) 2012 HL7 International</a:t>
+            </a:r>
+            <a:endParaRPr lang="en-US" dirty="0"/>
+          </a:p>
+        </p:txBody>
+      </p:sp>
+      <p:sp>
+        <p:nvSpPr>
+          <p:cNvPr id="5" name="Slide Number Placeholder 4"/>
+          <p:cNvSpPr>
+            <a:spLocks noGrp="1"/>
+          </p:cNvSpPr>
+          <p:nvPr>
+            <p:ph type="sldNum" sz="quarter" idx="12"/>
+          </p:nvPr>
+        </p:nvSpPr>
+        <p:spPr/>
+        <p:txBody>
+          <a:bodyPr/>
+          <a:lstStyle/>
+          <a:p>
+            <a:fld id="{990B41CA-569D-40E7-8E58-026C0338B2C8}" type="slidenum">
+              <a:rPr lang="en-US" smtClean="0"/>
+              <a:pPr/>
+              <a:t>14</a:t>
+            </a:fld>
+            <a:endParaRPr lang="en-US"/>
+          </a:p>
+        </p:txBody>
+      </p:sp>
     </p:spTree>
     <p:extLst>
       <p:ext uri="{BB962C8B-B14F-4D97-AF65-F5344CB8AC3E}">
@@ -5652,6 +5955,76 @@
           </a:extLst>
         </p:spPr>
       </p:pic>
+      <p:sp>
+        <p:nvSpPr>
+          <p:cNvPr id="3" name="Date Placeholder 2"/>
+          <p:cNvSpPr>
+            <a:spLocks noGrp="1"/>
+          </p:cNvSpPr>
+          <p:nvPr>
+            <p:ph type="dt" sz="half" idx="10"/>
+          </p:nvPr>
+        </p:nvSpPr>
+        <p:spPr/>
+        <p:txBody>
+          <a:bodyPr/>
+          <a:lstStyle/>
+          <a:p>
+            <a:fld id="{07DB5C76-06B7-4985-A9F6-62E707697014}" type="datetime1">
+              <a:rPr lang="en-US" smtClean="0"/>
+              <a:t>5/22/2012</a:t>
+            </a:fld>
+            <a:endParaRPr lang="en-US"/>
+          </a:p>
+        </p:txBody>
+      </p:sp>
+      <p:sp>
+        <p:nvSpPr>
+          <p:cNvPr id="4" name="Footer Placeholder 3"/>
+          <p:cNvSpPr>
+            <a:spLocks noGrp="1"/>
+          </p:cNvSpPr>
+          <p:nvPr>
+            <p:ph type="ftr" sz="quarter" idx="11"/>
+          </p:nvPr>
+        </p:nvSpPr>
+        <p:spPr/>
+        <p:txBody>
+          <a:bodyPr/>
+          <a:lstStyle/>
+          <a:p>
+            <a:r>
+              <a:rPr lang="en-US" smtClean="0"/>
+              <a:t>(c) 2012 HL7 International</a:t>
+            </a:r>
+            <a:endParaRPr lang="en-US" dirty="0"/>
+          </a:p>
+        </p:txBody>
+      </p:sp>
+      <p:sp>
+        <p:nvSpPr>
+          <p:cNvPr id="5" name="Slide Number Placeholder 4"/>
+          <p:cNvSpPr>
+            <a:spLocks noGrp="1"/>
+          </p:cNvSpPr>
+          <p:nvPr>
+            <p:ph type="sldNum" sz="quarter" idx="12"/>
+          </p:nvPr>
+        </p:nvSpPr>
+        <p:spPr/>
+        <p:txBody>
+          <a:bodyPr/>
+          <a:lstStyle/>
+          <a:p>
+            <a:fld id="{990B41CA-569D-40E7-8E58-026C0338B2C8}" type="slidenum">
+              <a:rPr lang="en-US" smtClean="0"/>
+              <a:pPr/>
+              <a:t>15</a:t>
+            </a:fld>
+            <a:endParaRPr lang="en-US"/>
+          </a:p>
+        </p:txBody>
+      </p:sp>
     </p:spTree>
     <p:extLst>
       <p:ext uri="{BB962C8B-B14F-4D97-AF65-F5344CB8AC3E}">
@@ -5800,6 +6173,76 @@
           </a:p>
         </p:txBody>
       </p:sp>
+      <p:sp>
+        <p:nvSpPr>
+          <p:cNvPr id="4" name="Date Placeholder 3"/>
+          <p:cNvSpPr>
+            <a:spLocks noGrp="1"/>
+          </p:cNvSpPr>
+          <p:nvPr>
+            <p:ph type="dt" sz="half" idx="10"/>
+          </p:nvPr>
+        </p:nvSpPr>
+        <p:spPr/>
+        <p:txBody>
+          <a:bodyPr/>
+          <a:lstStyle/>
+          <a:p>
+            <a:fld id="{1C978180-4C0B-49C8-8476-8B3ECBDE52D9}" type="datetime1">
+              <a:rPr lang="en-US" smtClean="0"/>
+              <a:t>5/22/2012</a:t>
+            </a:fld>
+            <a:endParaRPr lang="en-US"/>
+          </a:p>
+        </p:txBody>
+      </p:sp>
+      <p:sp>
+        <p:nvSpPr>
+          <p:cNvPr id="5" name="Footer Placeholder 4"/>
+          <p:cNvSpPr>
+            <a:spLocks noGrp="1"/>
+          </p:cNvSpPr>
+          <p:nvPr>
+            <p:ph type="ftr" sz="quarter" idx="11"/>
+          </p:nvPr>
+        </p:nvSpPr>
+        <p:spPr/>
+        <p:txBody>
+          <a:bodyPr/>
+          <a:lstStyle/>
+          <a:p>
+            <a:r>
+              <a:rPr lang="en-US" smtClean="0"/>
+              <a:t>(c) 2012 HL7 International</a:t>
+            </a:r>
+            <a:endParaRPr lang="en-US" dirty="0"/>
+          </a:p>
+        </p:txBody>
+      </p:sp>
+      <p:sp>
+        <p:nvSpPr>
+          <p:cNvPr id="6" name="Slide Number Placeholder 5"/>
+          <p:cNvSpPr>
+            <a:spLocks noGrp="1"/>
+          </p:cNvSpPr>
+          <p:nvPr>
+            <p:ph type="sldNum" sz="quarter" idx="12"/>
+          </p:nvPr>
+        </p:nvSpPr>
+        <p:spPr/>
+        <p:txBody>
+          <a:bodyPr/>
+          <a:lstStyle/>
+          <a:p>
+            <a:fld id="{990B41CA-569D-40E7-8E58-026C0338B2C8}" type="slidenum">
+              <a:rPr lang="en-US" smtClean="0"/>
+              <a:pPr/>
+              <a:t>16</a:t>
+            </a:fld>
+            <a:endParaRPr lang="en-US"/>
+          </a:p>
+        </p:txBody>
+      </p:sp>
     </p:spTree>
     <p:extLst>
       <p:ext uri="{BB962C8B-B14F-4D97-AF65-F5344CB8AC3E}">
@@ -5853,6 +6296,76 @@
           </a:p>
         </p:txBody>
       </p:sp>
+      <p:sp>
+        <p:nvSpPr>
+          <p:cNvPr id="2" name="Date Placeholder 1"/>
+          <p:cNvSpPr>
+            <a:spLocks noGrp="1"/>
+          </p:cNvSpPr>
+          <p:nvPr>
+            <p:ph type="dt" sz="half" idx="10"/>
+          </p:nvPr>
+        </p:nvSpPr>
+        <p:spPr/>
+        <p:txBody>
+          <a:bodyPr/>
+          <a:lstStyle/>
+          <a:p>
+            <a:fld id="{7DA55BEE-5620-40BD-8D99-D59A2C29316C}" type="datetime1">
+              <a:rPr lang="en-US" smtClean="0"/>
+              <a:t>5/22/2012</a:t>
+            </a:fld>
+            <a:endParaRPr lang="en-US"/>
+          </a:p>
+        </p:txBody>
+      </p:sp>
+      <p:sp>
+        <p:nvSpPr>
+          <p:cNvPr id="3" name="Footer Placeholder 2"/>
+          <p:cNvSpPr>
+            <a:spLocks noGrp="1"/>
+          </p:cNvSpPr>
+          <p:nvPr>
+            <p:ph type="ftr" sz="quarter" idx="11"/>
+          </p:nvPr>
+        </p:nvSpPr>
+        <p:spPr/>
+        <p:txBody>
+          <a:bodyPr/>
+          <a:lstStyle/>
+          <a:p>
+            <a:r>
+              <a:rPr lang="en-US" smtClean="0"/>
+              <a:t>(c) 2012 HL7 International</a:t>
+            </a:r>
+            <a:endParaRPr lang="en-US"/>
+          </a:p>
+        </p:txBody>
+      </p:sp>
+      <p:sp>
+        <p:nvSpPr>
+          <p:cNvPr id="4" name="Slide Number Placeholder 3"/>
+          <p:cNvSpPr>
+            <a:spLocks noGrp="1"/>
+          </p:cNvSpPr>
+          <p:nvPr>
+            <p:ph type="sldNum" sz="quarter" idx="12"/>
+          </p:nvPr>
+        </p:nvSpPr>
+        <p:spPr/>
+        <p:txBody>
+          <a:bodyPr/>
+          <a:lstStyle/>
+          <a:p>
+            <a:fld id="{990B41CA-569D-40E7-8E58-026C0338B2C8}" type="slidenum">
+              <a:rPr lang="en-US" smtClean="0"/>
+              <a:pPr/>
+              <a:t>17</a:t>
+            </a:fld>
+            <a:endParaRPr lang="en-US"/>
+          </a:p>
+        </p:txBody>
+      </p:sp>
     </p:spTree>
     <p:extLst>
       <p:ext uri="{BB962C8B-B14F-4D97-AF65-F5344CB8AC3E}">
@@ -5981,6 +6494,76 @@
           </a:p>
         </p:txBody>
       </p:sp>
+      <p:sp>
+        <p:nvSpPr>
+          <p:cNvPr id="4" name="Date Placeholder 3"/>
+          <p:cNvSpPr>
+            <a:spLocks noGrp="1"/>
+          </p:cNvSpPr>
+          <p:nvPr>
+            <p:ph type="dt" sz="half" idx="10"/>
+          </p:nvPr>
+        </p:nvSpPr>
+        <p:spPr/>
+        <p:txBody>
+          <a:bodyPr/>
+          <a:lstStyle/>
+          <a:p>
+            <a:fld id="{E35F205E-D529-4DC9-898B-B9C0CF5CC588}" type="datetime1">
+              <a:rPr lang="en-US" smtClean="0"/>
+              <a:t>5/22/2012</a:t>
+            </a:fld>
+            <a:endParaRPr lang="en-US"/>
+          </a:p>
+        </p:txBody>
+      </p:sp>
+      <p:sp>
+        <p:nvSpPr>
+          <p:cNvPr id="5" name="Footer Placeholder 4"/>
+          <p:cNvSpPr>
+            <a:spLocks noGrp="1"/>
+          </p:cNvSpPr>
+          <p:nvPr>
+            <p:ph type="ftr" sz="quarter" idx="11"/>
+          </p:nvPr>
+        </p:nvSpPr>
+        <p:spPr/>
+        <p:txBody>
+          <a:bodyPr/>
+          <a:lstStyle/>
+          <a:p>
+            <a:r>
+              <a:rPr lang="en-US" smtClean="0"/>
+              <a:t>(c) 2012 HL7 International</a:t>
+            </a:r>
+            <a:endParaRPr lang="en-US" dirty="0"/>
+          </a:p>
+        </p:txBody>
+      </p:sp>
+      <p:sp>
+        <p:nvSpPr>
+          <p:cNvPr id="6" name="Slide Number Placeholder 5"/>
+          <p:cNvSpPr>
+            <a:spLocks noGrp="1"/>
+          </p:cNvSpPr>
+          <p:nvPr>
+            <p:ph type="sldNum" sz="quarter" idx="12"/>
+          </p:nvPr>
+        </p:nvSpPr>
+        <p:spPr/>
+        <p:txBody>
+          <a:bodyPr/>
+          <a:lstStyle/>
+          <a:p>
+            <a:fld id="{990B41CA-569D-40E7-8E58-026C0338B2C8}" type="slidenum">
+              <a:rPr lang="en-US" smtClean="0"/>
+              <a:pPr/>
+              <a:t>18</a:t>
+            </a:fld>
+            <a:endParaRPr lang="en-US"/>
+          </a:p>
+        </p:txBody>
+      </p:sp>
     </p:spTree>
     <p:extLst>
       <p:ext uri="{BB962C8B-B14F-4D97-AF65-F5344CB8AC3E}">
@@ -6129,6 +6712,76 @@
           </a:p>
         </p:txBody>
       </p:sp>
+      <p:sp>
+        <p:nvSpPr>
+          <p:cNvPr id="4" name="Date Placeholder 3"/>
+          <p:cNvSpPr>
+            <a:spLocks noGrp="1"/>
+          </p:cNvSpPr>
+          <p:nvPr>
+            <p:ph type="dt" sz="half" idx="10"/>
+          </p:nvPr>
+        </p:nvSpPr>
+        <p:spPr/>
+        <p:txBody>
+          <a:bodyPr/>
+          <a:lstStyle/>
+          <a:p>
+            <a:fld id="{F46E0AAB-895A-4DF1-80D3-83AB4B773BF5}" type="datetime1">
+              <a:rPr lang="en-US" smtClean="0"/>
+              <a:t>5/22/2012</a:t>
+            </a:fld>
+            <a:endParaRPr lang="en-US"/>
+          </a:p>
+        </p:txBody>
+      </p:sp>
+      <p:sp>
+        <p:nvSpPr>
+          <p:cNvPr id="5" name="Footer Placeholder 4"/>
+          <p:cNvSpPr>
+            <a:spLocks noGrp="1"/>
+          </p:cNvSpPr>
+          <p:nvPr>
+            <p:ph type="ftr" sz="quarter" idx="11"/>
+          </p:nvPr>
+        </p:nvSpPr>
+        <p:spPr/>
+        <p:txBody>
+          <a:bodyPr/>
+          <a:lstStyle/>
+          <a:p>
+            <a:r>
+              <a:rPr lang="en-US" smtClean="0"/>
+              <a:t>(c) 2012 HL7 International</a:t>
+            </a:r>
+            <a:endParaRPr lang="en-US" dirty="0"/>
+          </a:p>
+        </p:txBody>
+      </p:sp>
+      <p:sp>
+        <p:nvSpPr>
+          <p:cNvPr id="6" name="Slide Number Placeholder 5"/>
+          <p:cNvSpPr>
+            <a:spLocks noGrp="1"/>
+          </p:cNvSpPr>
+          <p:nvPr>
+            <p:ph type="sldNum" sz="quarter" idx="12"/>
+          </p:nvPr>
+        </p:nvSpPr>
+        <p:spPr/>
+        <p:txBody>
+          <a:bodyPr/>
+          <a:lstStyle/>
+          <a:p>
+            <a:fld id="{990B41CA-569D-40E7-8E58-026C0338B2C8}" type="slidenum">
+              <a:rPr lang="en-US" smtClean="0"/>
+              <a:pPr/>
+              <a:t>19</a:t>
+            </a:fld>
+            <a:endParaRPr lang="en-US"/>
+          </a:p>
+        </p:txBody>
+      </p:sp>
     </p:spTree>
     <p:extLst>
       <p:ext uri="{BB962C8B-B14F-4D97-AF65-F5344CB8AC3E}">
@@ -6240,6 +6893,76 @@
           </a:p>
         </p:txBody>
       </p:sp>
+      <p:sp>
+        <p:nvSpPr>
+          <p:cNvPr id="2" name="Date Placeholder 1"/>
+          <p:cNvSpPr>
+            <a:spLocks noGrp="1"/>
+          </p:cNvSpPr>
+          <p:nvPr>
+            <p:ph type="dt" sz="half" idx="10"/>
+          </p:nvPr>
+        </p:nvSpPr>
+        <p:spPr/>
+        <p:txBody>
+          <a:bodyPr/>
+          <a:lstStyle/>
+          <a:p>
+            <a:fld id="{69011215-C960-47E9-9E99-420AF4364BA8}" type="datetime1">
+              <a:rPr lang="en-US" smtClean="0"/>
+              <a:t>5/22/2012</a:t>
+            </a:fld>
+            <a:endParaRPr lang="en-US"/>
+          </a:p>
+        </p:txBody>
+      </p:sp>
+      <p:sp>
+        <p:nvSpPr>
+          <p:cNvPr id="3" name="Footer Placeholder 2"/>
+          <p:cNvSpPr>
+            <a:spLocks noGrp="1"/>
+          </p:cNvSpPr>
+          <p:nvPr>
+            <p:ph type="ftr" sz="quarter" idx="11"/>
+          </p:nvPr>
+        </p:nvSpPr>
+        <p:spPr/>
+        <p:txBody>
+          <a:bodyPr/>
+          <a:lstStyle/>
+          <a:p>
+            <a:r>
+              <a:rPr lang="en-US" smtClean="0"/>
+              <a:t>(c) 2012 HL7 International</a:t>
+            </a:r>
+            <a:endParaRPr lang="en-US" dirty="0"/>
+          </a:p>
+        </p:txBody>
+      </p:sp>
+      <p:sp>
+        <p:nvSpPr>
+          <p:cNvPr id="6" name="Slide Number Placeholder 5"/>
+          <p:cNvSpPr>
+            <a:spLocks noGrp="1"/>
+          </p:cNvSpPr>
+          <p:nvPr>
+            <p:ph type="sldNum" sz="quarter" idx="12"/>
+          </p:nvPr>
+        </p:nvSpPr>
+        <p:spPr/>
+        <p:txBody>
+          <a:bodyPr/>
+          <a:lstStyle/>
+          <a:p>
+            <a:fld id="{990B41CA-569D-40E7-8E58-026C0338B2C8}" type="slidenum">
+              <a:rPr lang="en-US" smtClean="0"/>
+              <a:pPr/>
+              <a:t>2</a:t>
+            </a:fld>
+            <a:endParaRPr lang="en-US"/>
+          </a:p>
+        </p:txBody>
+      </p:sp>
     </p:spTree>
     <p:extLst>
       <p:ext uri="{BB962C8B-B14F-4D97-AF65-F5344CB8AC3E}">
@@ -6349,6 +7072,76 @@
           </a:p>
         </p:txBody>
       </p:sp>
+      <p:sp>
+        <p:nvSpPr>
+          <p:cNvPr id="4" name="Date Placeholder 3"/>
+          <p:cNvSpPr>
+            <a:spLocks noGrp="1"/>
+          </p:cNvSpPr>
+          <p:nvPr>
+            <p:ph type="dt" sz="half" idx="10"/>
+          </p:nvPr>
+        </p:nvSpPr>
+        <p:spPr/>
+        <p:txBody>
+          <a:bodyPr/>
+          <a:lstStyle/>
+          <a:p>
+            <a:fld id="{DF6D43A3-14A1-4992-93E1-7CDD71B5C9C9}" type="datetime1">
+              <a:rPr lang="en-US" smtClean="0"/>
+              <a:t>5/22/2012</a:t>
+            </a:fld>
+            <a:endParaRPr lang="en-US"/>
+          </a:p>
+        </p:txBody>
+      </p:sp>
+      <p:sp>
+        <p:nvSpPr>
+          <p:cNvPr id="5" name="Footer Placeholder 4"/>
+          <p:cNvSpPr>
+            <a:spLocks noGrp="1"/>
+          </p:cNvSpPr>
+          <p:nvPr>
+            <p:ph type="ftr" sz="quarter" idx="11"/>
+          </p:nvPr>
+        </p:nvSpPr>
+        <p:spPr/>
+        <p:txBody>
+          <a:bodyPr/>
+          <a:lstStyle/>
+          <a:p>
+            <a:r>
+              <a:rPr lang="en-US" smtClean="0"/>
+              <a:t>(c) 2012 HL7 International</a:t>
+            </a:r>
+            <a:endParaRPr lang="en-US" dirty="0"/>
+          </a:p>
+        </p:txBody>
+      </p:sp>
+      <p:sp>
+        <p:nvSpPr>
+          <p:cNvPr id="6" name="Slide Number Placeholder 5"/>
+          <p:cNvSpPr>
+            <a:spLocks noGrp="1"/>
+          </p:cNvSpPr>
+          <p:nvPr>
+            <p:ph type="sldNum" sz="quarter" idx="12"/>
+          </p:nvPr>
+        </p:nvSpPr>
+        <p:spPr/>
+        <p:txBody>
+          <a:bodyPr/>
+          <a:lstStyle/>
+          <a:p>
+            <a:fld id="{990B41CA-569D-40E7-8E58-026C0338B2C8}" type="slidenum">
+              <a:rPr lang="en-US" smtClean="0"/>
+              <a:pPr/>
+              <a:t>20</a:t>
+            </a:fld>
+            <a:endParaRPr lang="en-US"/>
+          </a:p>
+        </p:txBody>
+      </p:sp>
     </p:spTree>
     <p:extLst>
       <p:ext uri="{BB962C8B-B14F-4D97-AF65-F5344CB8AC3E}">
@@ -6476,6 +7269,76 @@
           </a:p>
         </p:txBody>
       </p:sp>
+      <p:sp>
+        <p:nvSpPr>
+          <p:cNvPr id="4" name="Date Placeholder 3"/>
+          <p:cNvSpPr>
+            <a:spLocks noGrp="1"/>
+          </p:cNvSpPr>
+          <p:nvPr>
+            <p:ph type="dt" sz="half" idx="10"/>
+          </p:nvPr>
+        </p:nvSpPr>
+        <p:spPr/>
+        <p:txBody>
+          <a:bodyPr/>
+          <a:lstStyle/>
+          <a:p>
+            <a:fld id="{70C2B4D8-CAA4-412F-8DE0-0D1A8C8CDF5B}" type="datetime1">
+              <a:rPr lang="en-US" smtClean="0"/>
+              <a:t>5/22/2012</a:t>
+            </a:fld>
+            <a:endParaRPr lang="en-US"/>
+          </a:p>
+        </p:txBody>
+      </p:sp>
+      <p:sp>
+        <p:nvSpPr>
+          <p:cNvPr id="5" name="Footer Placeholder 4"/>
+          <p:cNvSpPr>
+            <a:spLocks noGrp="1"/>
+          </p:cNvSpPr>
+          <p:nvPr>
+            <p:ph type="ftr" sz="quarter" idx="11"/>
+          </p:nvPr>
+        </p:nvSpPr>
+        <p:spPr/>
+        <p:txBody>
+          <a:bodyPr/>
+          <a:lstStyle/>
+          <a:p>
+            <a:r>
+              <a:rPr lang="en-US" smtClean="0"/>
+              <a:t>(c) 2012 HL7 International</a:t>
+            </a:r>
+            <a:endParaRPr lang="en-US" dirty="0"/>
+          </a:p>
+        </p:txBody>
+      </p:sp>
+      <p:sp>
+        <p:nvSpPr>
+          <p:cNvPr id="6" name="Slide Number Placeholder 5"/>
+          <p:cNvSpPr>
+            <a:spLocks noGrp="1"/>
+          </p:cNvSpPr>
+          <p:nvPr>
+            <p:ph type="sldNum" sz="quarter" idx="12"/>
+          </p:nvPr>
+        </p:nvSpPr>
+        <p:spPr/>
+        <p:txBody>
+          <a:bodyPr/>
+          <a:lstStyle/>
+          <a:p>
+            <a:fld id="{990B41CA-569D-40E7-8E58-026C0338B2C8}" type="slidenum">
+              <a:rPr lang="en-US" smtClean="0"/>
+              <a:pPr/>
+              <a:t>21</a:t>
+            </a:fld>
+            <a:endParaRPr lang="en-US"/>
+          </a:p>
+        </p:txBody>
+      </p:sp>
     </p:spTree>
     <p:extLst>
       <p:ext uri="{BB962C8B-B14F-4D97-AF65-F5344CB8AC3E}">
@@ -6602,6 +7465,76 @@
           </a:p>
         </p:txBody>
       </p:sp>
+      <p:sp>
+        <p:nvSpPr>
+          <p:cNvPr id="4" name="Date Placeholder 3"/>
+          <p:cNvSpPr>
+            <a:spLocks noGrp="1"/>
+          </p:cNvSpPr>
+          <p:nvPr>
+            <p:ph type="dt" sz="half" idx="10"/>
+          </p:nvPr>
+        </p:nvSpPr>
+        <p:spPr/>
+        <p:txBody>
+          <a:bodyPr/>
+          <a:lstStyle/>
+          <a:p>
+            <a:fld id="{FB288A3D-93FC-42A8-8A69-5E1F7A36C1CF}" type="datetime1">
+              <a:rPr lang="en-US" smtClean="0"/>
+              <a:t>5/22/2012</a:t>
+            </a:fld>
+            <a:endParaRPr lang="en-US"/>
+          </a:p>
+        </p:txBody>
+      </p:sp>
+      <p:sp>
+        <p:nvSpPr>
+          <p:cNvPr id="5" name="Footer Placeholder 4"/>
+          <p:cNvSpPr>
+            <a:spLocks noGrp="1"/>
+          </p:cNvSpPr>
+          <p:nvPr>
+            <p:ph type="ftr" sz="quarter" idx="11"/>
+          </p:nvPr>
+        </p:nvSpPr>
+        <p:spPr/>
+        <p:txBody>
+          <a:bodyPr/>
+          <a:lstStyle/>
+          <a:p>
+            <a:r>
+              <a:rPr lang="en-US" smtClean="0"/>
+              <a:t>(c) 2012 HL7 International</a:t>
+            </a:r>
+            <a:endParaRPr lang="en-US" dirty="0"/>
+          </a:p>
+        </p:txBody>
+      </p:sp>
+      <p:sp>
+        <p:nvSpPr>
+          <p:cNvPr id="6" name="Slide Number Placeholder 5"/>
+          <p:cNvSpPr>
+            <a:spLocks noGrp="1"/>
+          </p:cNvSpPr>
+          <p:nvPr>
+            <p:ph type="sldNum" sz="quarter" idx="12"/>
+          </p:nvPr>
+        </p:nvSpPr>
+        <p:spPr/>
+        <p:txBody>
+          <a:bodyPr/>
+          <a:lstStyle/>
+          <a:p>
+            <a:fld id="{990B41CA-569D-40E7-8E58-026C0338B2C8}" type="slidenum">
+              <a:rPr lang="en-US" smtClean="0"/>
+              <a:pPr/>
+              <a:t>22</a:t>
+            </a:fld>
+            <a:endParaRPr lang="en-US"/>
+          </a:p>
+        </p:txBody>
+      </p:sp>
     </p:spTree>
     <p:extLst>
       <p:ext uri="{BB962C8B-B14F-4D97-AF65-F5344CB8AC3E}">
@@ -6768,6 +7701,76 @@
           </a:p>
         </p:txBody>
       </p:sp>
+      <p:sp>
+        <p:nvSpPr>
+          <p:cNvPr id="4" name="Date Placeholder 3"/>
+          <p:cNvSpPr>
+            <a:spLocks noGrp="1"/>
+          </p:cNvSpPr>
+          <p:nvPr>
+            <p:ph type="dt" sz="half" idx="10"/>
+          </p:nvPr>
+        </p:nvSpPr>
+        <p:spPr/>
+        <p:txBody>
+          <a:bodyPr/>
+          <a:lstStyle/>
+          <a:p>
+            <a:fld id="{6988DC96-518B-4A5A-8560-216D1D6EAED1}" type="datetime1">
+              <a:rPr lang="en-US" smtClean="0"/>
+              <a:t>5/22/2012</a:t>
+            </a:fld>
+            <a:endParaRPr lang="en-US"/>
+          </a:p>
+        </p:txBody>
+      </p:sp>
+      <p:sp>
+        <p:nvSpPr>
+          <p:cNvPr id="5" name="Footer Placeholder 4"/>
+          <p:cNvSpPr>
+            <a:spLocks noGrp="1"/>
+          </p:cNvSpPr>
+          <p:nvPr>
+            <p:ph type="ftr" sz="quarter" idx="11"/>
+          </p:nvPr>
+        </p:nvSpPr>
+        <p:spPr/>
+        <p:txBody>
+          <a:bodyPr/>
+          <a:lstStyle/>
+          <a:p>
+            <a:r>
+              <a:rPr lang="en-US" smtClean="0"/>
+              <a:t>(c) 2012 HL7 International</a:t>
+            </a:r>
+            <a:endParaRPr lang="en-US" dirty="0"/>
+          </a:p>
+        </p:txBody>
+      </p:sp>
+      <p:sp>
+        <p:nvSpPr>
+          <p:cNvPr id="6" name="Slide Number Placeholder 5"/>
+          <p:cNvSpPr>
+            <a:spLocks noGrp="1"/>
+          </p:cNvSpPr>
+          <p:nvPr>
+            <p:ph type="sldNum" sz="quarter" idx="12"/>
+          </p:nvPr>
+        </p:nvSpPr>
+        <p:spPr/>
+        <p:txBody>
+          <a:bodyPr/>
+          <a:lstStyle/>
+          <a:p>
+            <a:fld id="{990B41CA-569D-40E7-8E58-026C0338B2C8}" type="slidenum">
+              <a:rPr lang="en-US" smtClean="0"/>
+              <a:pPr/>
+              <a:t>23</a:t>
+            </a:fld>
+            <a:endParaRPr lang="en-US"/>
+          </a:p>
+        </p:txBody>
+      </p:sp>
     </p:spTree>
     <p:extLst>
       <p:ext uri="{BB962C8B-B14F-4D97-AF65-F5344CB8AC3E}">
@@ -6888,6 +7891,76 @@
           </a:p>
         </p:txBody>
       </p:sp>
+      <p:sp>
+        <p:nvSpPr>
+          <p:cNvPr id="4" name="Date Placeholder 3"/>
+          <p:cNvSpPr>
+            <a:spLocks noGrp="1"/>
+          </p:cNvSpPr>
+          <p:nvPr>
+            <p:ph type="dt" sz="half" idx="10"/>
+          </p:nvPr>
+        </p:nvSpPr>
+        <p:spPr/>
+        <p:txBody>
+          <a:bodyPr/>
+          <a:lstStyle/>
+          <a:p>
+            <a:fld id="{9944E42B-D19C-45C7-8653-C304E5200561}" type="datetime1">
+              <a:rPr lang="en-US" smtClean="0"/>
+              <a:t>5/22/2012</a:t>
+            </a:fld>
+            <a:endParaRPr lang="en-US"/>
+          </a:p>
+        </p:txBody>
+      </p:sp>
+      <p:sp>
+        <p:nvSpPr>
+          <p:cNvPr id="5" name="Footer Placeholder 4"/>
+          <p:cNvSpPr>
+            <a:spLocks noGrp="1"/>
+          </p:cNvSpPr>
+          <p:nvPr>
+            <p:ph type="ftr" sz="quarter" idx="11"/>
+          </p:nvPr>
+        </p:nvSpPr>
+        <p:spPr/>
+        <p:txBody>
+          <a:bodyPr/>
+          <a:lstStyle/>
+          <a:p>
+            <a:r>
+              <a:rPr lang="en-US" smtClean="0"/>
+              <a:t>(c) 2012 HL7 International</a:t>
+            </a:r>
+            <a:endParaRPr lang="en-US" dirty="0"/>
+          </a:p>
+        </p:txBody>
+      </p:sp>
+      <p:sp>
+        <p:nvSpPr>
+          <p:cNvPr id="6" name="Slide Number Placeholder 5"/>
+          <p:cNvSpPr>
+            <a:spLocks noGrp="1"/>
+          </p:cNvSpPr>
+          <p:nvPr>
+            <p:ph type="sldNum" sz="quarter" idx="12"/>
+          </p:nvPr>
+        </p:nvSpPr>
+        <p:spPr/>
+        <p:txBody>
+          <a:bodyPr/>
+          <a:lstStyle/>
+          <a:p>
+            <a:fld id="{990B41CA-569D-40E7-8E58-026C0338B2C8}" type="slidenum">
+              <a:rPr lang="en-US" smtClean="0"/>
+              <a:pPr/>
+              <a:t>24</a:t>
+            </a:fld>
+            <a:endParaRPr lang="en-US"/>
+          </a:p>
+        </p:txBody>
+      </p:sp>
     </p:spTree>
     <p:extLst>
       <p:ext uri="{BB962C8B-B14F-4D97-AF65-F5344CB8AC3E}">
@@ -7042,6 +8115,76 @@
           </a:p>
         </p:txBody>
       </p:sp>
+      <p:sp>
+        <p:nvSpPr>
+          <p:cNvPr id="4" name="Date Placeholder 3"/>
+          <p:cNvSpPr>
+            <a:spLocks noGrp="1"/>
+          </p:cNvSpPr>
+          <p:nvPr>
+            <p:ph type="dt" sz="half" idx="10"/>
+          </p:nvPr>
+        </p:nvSpPr>
+        <p:spPr/>
+        <p:txBody>
+          <a:bodyPr/>
+          <a:lstStyle/>
+          <a:p>
+            <a:fld id="{A0D0AFF1-551C-47F0-9691-F199F7524FD8}" type="datetime1">
+              <a:rPr lang="en-US" smtClean="0"/>
+              <a:t>5/22/2012</a:t>
+            </a:fld>
+            <a:endParaRPr lang="en-US"/>
+          </a:p>
+        </p:txBody>
+      </p:sp>
+      <p:sp>
+        <p:nvSpPr>
+          <p:cNvPr id="5" name="Footer Placeholder 4"/>
+          <p:cNvSpPr>
+            <a:spLocks noGrp="1"/>
+          </p:cNvSpPr>
+          <p:nvPr>
+            <p:ph type="ftr" sz="quarter" idx="11"/>
+          </p:nvPr>
+        </p:nvSpPr>
+        <p:spPr/>
+        <p:txBody>
+          <a:bodyPr/>
+          <a:lstStyle/>
+          <a:p>
+            <a:r>
+              <a:rPr lang="en-US" smtClean="0"/>
+              <a:t>(c) 2012 HL7 International</a:t>
+            </a:r>
+            <a:endParaRPr lang="en-US" dirty="0"/>
+          </a:p>
+        </p:txBody>
+      </p:sp>
+      <p:sp>
+        <p:nvSpPr>
+          <p:cNvPr id="6" name="Slide Number Placeholder 5"/>
+          <p:cNvSpPr>
+            <a:spLocks noGrp="1"/>
+          </p:cNvSpPr>
+          <p:nvPr>
+            <p:ph type="sldNum" sz="quarter" idx="12"/>
+          </p:nvPr>
+        </p:nvSpPr>
+        <p:spPr/>
+        <p:txBody>
+          <a:bodyPr/>
+          <a:lstStyle/>
+          <a:p>
+            <a:fld id="{990B41CA-569D-40E7-8E58-026C0338B2C8}" type="slidenum">
+              <a:rPr lang="en-US" smtClean="0"/>
+              <a:pPr/>
+              <a:t>25</a:t>
+            </a:fld>
+            <a:endParaRPr lang="en-US"/>
+          </a:p>
+        </p:txBody>
+      </p:sp>
     </p:spTree>
     <p:extLst>
       <p:ext uri="{BB962C8B-B14F-4D97-AF65-F5344CB8AC3E}">
@@ -7095,6 +8238,76 @@
           </a:p>
         </p:txBody>
       </p:sp>
+      <p:sp>
+        <p:nvSpPr>
+          <p:cNvPr id="2" name="Date Placeholder 1"/>
+          <p:cNvSpPr>
+            <a:spLocks noGrp="1"/>
+          </p:cNvSpPr>
+          <p:nvPr>
+            <p:ph type="dt" sz="half" idx="10"/>
+          </p:nvPr>
+        </p:nvSpPr>
+        <p:spPr/>
+        <p:txBody>
+          <a:bodyPr/>
+          <a:lstStyle/>
+          <a:p>
+            <a:fld id="{EE55FC29-E506-4946-9938-050717E15B98}" type="datetime1">
+              <a:rPr lang="en-US" smtClean="0"/>
+              <a:t>5/22/2012</a:t>
+            </a:fld>
+            <a:endParaRPr lang="en-US"/>
+          </a:p>
+        </p:txBody>
+      </p:sp>
+      <p:sp>
+        <p:nvSpPr>
+          <p:cNvPr id="3" name="Footer Placeholder 2"/>
+          <p:cNvSpPr>
+            <a:spLocks noGrp="1"/>
+          </p:cNvSpPr>
+          <p:nvPr>
+            <p:ph type="ftr" sz="quarter" idx="11"/>
+          </p:nvPr>
+        </p:nvSpPr>
+        <p:spPr/>
+        <p:txBody>
+          <a:bodyPr/>
+          <a:lstStyle/>
+          <a:p>
+            <a:r>
+              <a:rPr lang="en-US" smtClean="0"/>
+              <a:t>(c) 2012 HL7 International</a:t>
+            </a:r>
+            <a:endParaRPr lang="en-US"/>
+          </a:p>
+        </p:txBody>
+      </p:sp>
+      <p:sp>
+        <p:nvSpPr>
+          <p:cNvPr id="4" name="Slide Number Placeholder 3"/>
+          <p:cNvSpPr>
+            <a:spLocks noGrp="1"/>
+          </p:cNvSpPr>
+          <p:nvPr>
+            <p:ph type="sldNum" sz="quarter" idx="12"/>
+          </p:nvPr>
+        </p:nvSpPr>
+        <p:spPr/>
+        <p:txBody>
+          <a:bodyPr/>
+          <a:lstStyle/>
+          <a:p>
+            <a:fld id="{990B41CA-569D-40E7-8E58-026C0338B2C8}" type="slidenum">
+              <a:rPr lang="en-US" smtClean="0"/>
+              <a:pPr/>
+              <a:t>26</a:t>
+            </a:fld>
+            <a:endParaRPr lang="en-US"/>
+          </a:p>
+        </p:txBody>
+      </p:sp>
     </p:spTree>
     <p:extLst>
       <p:ext uri="{BB962C8B-B14F-4D97-AF65-F5344CB8AC3E}">
@@ -7148,6 +8361,76 @@
           </a:p>
         </p:txBody>
       </p:sp>
+      <p:sp>
+        <p:nvSpPr>
+          <p:cNvPr id="2" name="Date Placeholder 1"/>
+          <p:cNvSpPr>
+            <a:spLocks noGrp="1"/>
+          </p:cNvSpPr>
+          <p:nvPr>
+            <p:ph type="dt" sz="half" idx="10"/>
+          </p:nvPr>
+        </p:nvSpPr>
+        <p:spPr/>
+        <p:txBody>
+          <a:bodyPr/>
+          <a:lstStyle/>
+          <a:p>
+            <a:fld id="{F0560040-F62E-4E77-8660-C1C1701533FB}" type="datetime1">
+              <a:rPr lang="en-US" smtClean="0"/>
+              <a:t>5/22/2012</a:t>
+            </a:fld>
+            <a:endParaRPr lang="en-US"/>
+          </a:p>
+        </p:txBody>
+      </p:sp>
+      <p:sp>
+        <p:nvSpPr>
+          <p:cNvPr id="3" name="Footer Placeholder 2"/>
+          <p:cNvSpPr>
+            <a:spLocks noGrp="1"/>
+          </p:cNvSpPr>
+          <p:nvPr>
+            <p:ph type="ftr" sz="quarter" idx="11"/>
+          </p:nvPr>
+        </p:nvSpPr>
+        <p:spPr/>
+        <p:txBody>
+          <a:bodyPr/>
+          <a:lstStyle/>
+          <a:p>
+            <a:r>
+              <a:rPr lang="en-US" smtClean="0"/>
+              <a:t>(c) 2012 HL7 International</a:t>
+            </a:r>
+            <a:endParaRPr lang="en-US"/>
+          </a:p>
+        </p:txBody>
+      </p:sp>
+      <p:sp>
+        <p:nvSpPr>
+          <p:cNvPr id="4" name="Slide Number Placeholder 3"/>
+          <p:cNvSpPr>
+            <a:spLocks noGrp="1"/>
+          </p:cNvSpPr>
+          <p:nvPr>
+            <p:ph type="sldNum" sz="quarter" idx="12"/>
+          </p:nvPr>
+        </p:nvSpPr>
+        <p:spPr/>
+        <p:txBody>
+          <a:bodyPr/>
+          <a:lstStyle/>
+          <a:p>
+            <a:fld id="{990B41CA-569D-40E7-8E58-026C0338B2C8}" type="slidenum">
+              <a:rPr lang="en-US" smtClean="0"/>
+              <a:pPr/>
+              <a:t>27</a:t>
+            </a:fld>
+            <a:endParaRPr lang="en-US"/>
+          </a:p>
+        </p:txBody>
+      </p:sp>
     </p:spTree>
     <p:extLst>
       <p:ext uri="{BB962C8B-B14F-4D97-AF65-F5344CB8AC3E}">
@@ -7244,6 +8527,76 @@
           </a:p>
         </p:txBody>
       </p:sp>
+      <p:sp>
+        <p:nvSpPr>
+          <p:cNvPr id="4" name="Date Placeholder 3"/>
+          <p:cNvSpPr>
+            <a:spLocks noGrp="1"/>
+          </p:cNvSpPr>
+          <p:nvPr>
+            <p:ph type="dt" sz="half" idx="10"/>
+          </p:nvPr>
+        </p:nvSpPr>
+        <p:spPr/>
+        <p:txBody>
+          <a:bodyPr/>
+          <a:lstStyle/>
+          <a:p>
+            <a:fld id="{E03F9E2B-F109-482E-9F82-11EE4308BC53}" type="datetime1">
+              <a:rPr lang="en-US" smtClean="0"/>
+              <a:t>5/22/2012</a:t>
+            </a:fld>
+            <a:endParaRPr lang="en-US"/>
+          </a:p>
+        </p:txBody>
+      </p:sp>
+      <p:sp>
+        <p:nvSpPr>
+          <p:cNvPr id="5" name="Footer Placeholder 4"/>
+          <p:cNvSpPr>
+            <a:spLocks noGrp="1"/>
+          </p:cNvSpPr>
+          <p:nvPr>
+            <p:ph type="ftr" sz="quarter" idx="11"/>
+          </p:nvPr>
+        </p:nvSpPr>
+        <p:spPr/>
+        <p:txBody>
+          <a:bodyPr/>
+          <a:lstStyle/>
+          <a:p>
+            <a:r>
+              <a:rPr lang="en-US" smtClean="0"/>
+              <a:t>(c) 2012 HL7 International</a:t>
+            </a:r>
+            <a:endParaRPr lang="en-US" dirty="0"/>
+          </a:p>
+        </p:txBody>
+      </p:sp>
+      <p:sp>
+        <p:nvSpPr>
+          <p:cNvPr id="6" name="Slide Number Placeholder 5"/>
+          <p:cNvSpPr>
+            <a:spLocks noGrp="1"/>
+          </p:cNvSpPr>
+          <p:nvPr>
+            <p:ph type="sldNum" sz="quarter" idx="12"/>
+          </p:nvPr>
+        </p:nvSpPr>
+        <p:spPr/>
+        <p:txBody>
+          <a:bodyPr/>
+          <a:lstStyle/>
+          <a:p>
+            <a:fld id="{990B41CA-569D-40E7-8E58-026C0338B2C8}" type="slidenum">
+              <a:rPr lang="en-US" smtClean="0"/>
+              <a:pPr/>
+              <a:t>28</a:t>
+            </a:fld>
+            <a:endParaRPr lang="en-US"/>
+          </a:p>
+        </p:txBody>
+      </p:sp>
     </p:spTree>
     <p:extLst>
       <p:ext uri="{BB962C8B-B14F-4D97-AF65-F5344CB8AC3E}">
@@ -7367,6 +8720,76 @@
           </a:p>
         </p:txBody>
       </p:sp>
+      <p:sp>
+        <p:nvSpPr>
+          <p:cNvPr id="4" name="Date Placeholder 3"/>
+          <p:cNvSpPr>
+            <a:spLocks noGrp="1"/>
+          </p:cNvSpPr>
+          <p:nvPr>
+            <p:ph type="dt" sz="half" idx="10"/>
+          </p:nvPr>
+        </p:nvSpPr>
+        <p:spPr/>
+        <p:txBody>
+          <a:bodyPr/>
+          <a:lstStyle/>
+          <a:p>
+            <a:fld id="{83B78C2E-C2AA-47F3-B532-86D18CE52FCE}" type="datetime1">
+              <a:rPr lang="en-US" smtClean="0"/>
+              <a:t>5/22/2012</a:t>
+            </a:fld>
+            <a:endParaRPr lang="en-US"/>
+          </a:p>
+        </p:txBody>
+      </p:sp>
+      <p:sp>
+        <p:nvSpPr>
+          <p:cNvPr id="5" name="Footer Placeholder 4"/>
+          <p:cNvSpPr>
+            <a:spLocks noGrp="1"/>
+          </p:cNvSpPr>
+          <p:nvPr>
+            <p:ph type="ftr" sz="quarter" idx="11"/>
+          </p:nvPr>
+        </p:nvSpPr>
+        <p:spPr/>
+        <p:txBody>
+          <a:bodyPr/>
+          <a:lstStyle/>
+          <a:p>
+            <a:r>
+              <a:rPr lang="en-US" smtClean="0"/>
+              <a:t>(c) 2012 HL7 International</a:t>
+            </a:r>
+            <a:endParaRPr lang="en-US" dirty="0"/>
+          </a:p>
+        </p:txBody>
+      </p:sp>
+      <p:sp>
+        <p:nvSpPr>
+          <p:cNvPr id="6" name="Slide Number Placeholder 5"/>
+          <p:cNvSpPr>
+            <a:spLocks noGrp="1"/>
+          </p:cNvSpPr>
+          <p:nvPr>
+            <p:ph type="sldNum" sz="quarter" idx="12"/>
+          </p:nvPr>
+        </p:nvSpPr>
+        <p:spPr/>
+        <p:txBody>
+          <a:bodyPr/>
+          <a:lstStyle/>
+          <a:p>
+            <a:fld id="{990B41CA-569D-40E7-8E58-026C0338B2C8}" type="slidenum">
+              <a:rPr lang="en-US" smtClean="0"/>
+              <a:pPr/>
+              <a:t>29</a:t>
+            </a:fld>
+            <a:endParaRPr lang="en-US"/>
+          </a:p>
+        </p:txBody>
+      </p:sp>
     </p:spTree>
     <p:extLst>
       <p:ext uri="{BB962C8B-B14F-4D97-AF65-F5344CB8AC3E}">
@@ -7499,6 +8922,76 @@
           </a:p>
         </p:txBody>
       </p:sp>
+      <p:sp>
+        <p:nvSpPr>
+          <p:cNvPr id="4" name="Date Placeholder 3"/>
+          <p:cNvSpPr>
+            <a:spLocks noGrp="1"/>
+          </p:cNvSpPr>
+          <p:nvPr>
+            <p:ph type="dt" sz="half" idx="10"/>
+          </p:nvPr>
+        </p:nvSpPr>
+        <p:spPr/>
+        <p:txBody>
+          <a:bodyPr/>
+          <a:lstStyle/>
+          <a:p>
+            <a:fld id="{58932677-AA23-4875-BE07-AA2BDC54FD2E}" type="datetime1">
+              <a:rPr lang="en-US" smtClean="0"/>
+              <a:t>5/22/2012</a:t>
+            </a:fld>
+            <a:endParaRPr lang="en-US"/>
+          </a:p>
+        </p:txBody>
+      </p:sp>
+      <p:sp>
+        <p:nvSpPr>
+          <p:cNvPr id="5" name="Footer Placeholder 4"/>
+          <p:cNvSpPr>
+            <a:spLocks noGrp="1"/>
+          </p:cNvSpPr>
+          <p:nvPr>
+            <p:ph type="ftr" sz="quarter" idx="11"/>
+          </p:nvPr>
+        </p:nvSpPr>
+        <p:spPr/>
+        <p:txBody>
+          <a:bodyPr/>
+          <a:lstStyle/>
+          <a:p>
+            <a:r>
+              <a:rPr lang="en-US" smtClean="0"/>
+              <a:t>(c) 2012 HL7 International</a:t>
+            </a:r>
+            <a:endParaRPr lang="en-US" dirty="0"/>
+          </a:p>
+        </p:txBody>
+      </p:sp>
+      <p:sp>
+        <p:nvSpPr>
+          <p:cNvPr id="6" name="Slide Number Placeholder 5"/>
+          <p:cNvSpPr>
+            <a:spLocks noGrp="1"/>
+          </p:cNvSpPr>
+          <p:nvPr>
+            <p:ph type="sldNum" sz="quarter" idx="12"/>
+          </p:nvPr>
+        </p:nvSpPr>
+        <p:spPr/>
+        <p:txBody>
+          <a:bodyPr/>
+          <a:lstStyle/>
+          <a:p>
+            <a:fld id="{990B41CA-569D-40E7-8E58-026C0338B2C8}" type="slidenum">
+              <a:rPr lang="en-US" smtClean="0"/>
+              <a:pPr/>
+              <a:t>3</a:t>
+            </a:fld>
+            <a:endParaRPr lang="en-US"/>
+          </a:p>
+        </p:txBody>
+      </p:sp>
     </p:spTree>
     <p:extLst>
       <p:ext uri="{BB962C8B-B14F-4D97-AF65-F5344CB8AC3E}">
@@ -7611,6 +9104,76 @@
           </a:p>
         </p:txBody>
       </p:sp>
+      <p:sp>
+        <p:nvSpPr>
+          <p:cNvPr id="4" name="Date Placeholder 3"/>
+          <p:cNvSpPr>
+            <a:spLocks noGrp="1"/>
+          </p:cNvSpPr>
+          <p:nvPr>
+            <p:ph type="dt" sz="half" idx="10"/>
+          </p:nvPr>
+        </p:nvSpPr>
+        <p:spPr/>
+        <p:txBody>
+          <a:bodyPr/>
+          <a:lstStyle/>
+          <a:p>
+            <a:fld id="{3DC9D6F2-DB9E-4732-BB63-E4DE9D9708C4}" type="datetime1">
+              <a:rPr lang="en-US" smtClean="0"/>
+              <a:t>5/22/2012</a:t>
+            </a:fld>
+            <a:endParaRPr lang="en-US"/>
+          </a:p>
+        </p:txBody>
+      </p:sp>
+      <p:sp>
+        <p:nvSpPr>
+          <p:cNvPr id="5" name="Footer Placeholder 4"/>
+          <p:cNvSpPr>
+            <a:spLocks noGrp="1"/>
+          </p:cNvSpPr>
+          <p:nvPr>
+            <p:ph type="ftr" sz="quarter" idx="11"/>
+          </p:nvPr>
+        </p:nvSpPr>
+        <p:spPr/>
+        <p:txBody>
+          <a:bodyPr/>
+          <a:lstStyle/>
+          <a:p>
+            <a:r>
+              <a:rPr lang="en-US" smtClean="0"/>
+              <a:t>(c) 2012 HL7 International</a:t>
+            </a:r>
+            <a:endParaRPr lang="en-US" dirty="0"/>
+          </a:p>
+        </p:txBody>
+      </p:sp>
+      <p:sp>
+        <p:nvSpPr>
+          <p:cNvPr id="6" name="Slide Number Placeholder 5"/>
+          <p:cNvSpPr>
+            <a:spLocks noGrp="1"/>
+          </p:cNvSpPr>
+          <p:nvPr>
+            <p:ph type="sldNum" sz="quarter" idx="12"/>
+          </p:nvPr>
+        </p:nvSpPr>
+        <p:spPr/>
+        <p:txBody>
+          <a:bodyPr/>
+          <a:lstStyle/>
+          <a:p>
+            <a:fld id="{990B41CA-569D-40E7-8E58-026C0338B2C8}" type="slidenum">
+              <a:rPr lang="en-US" smtClean="0"/>
+              <a:pPr/>
+              <a:t>30</a:t>
+            </a:fld>
+            <a:endParaRPr lang="en-US"/>
+          </a:p>
+        </p:txBody>
+      </p:sp>
     </p:spTree>
     <p:extLst>
       <p:ext uri="{BB962C8B-B14F-4D97-AF65-F5344CB8AC3E}">
@@ -7722,6 +9285,76 @@
           </a:p>
         </p:txBody>
       </p:sp>
+      <p:sp>
+        <p:nvSpPr>
+          <p:cNvPr id="4" name="Date Placeholder 3"/>
+          <p:cNvSpPr>
+            <a:spLocks noGrp="1"/>
+          </p:cNvSpPr>
+          <p:nvPr>
+            <p:ph type="dt" sz="half" idx="10"/>
+          </p:nvPr>
+        </p:nvSpPr>
+        <p:spPr/>
+        <p:txBody>
+          <a:bodyPr/>
+          <a:lstStyle/>
+          <a:p>
+            <a:fld id="{7F2578B6-4921-4FE5-BE00-917950CE7704}" type="datetime1">
+              <a:rPr lang="en-US" smtClean="0"/>
+              <a:t>5/22/2012</a:t>
+            </a:fld>
+            <a:endParaRPr lang="en-US"/>
+          </a:p>
+        </p:txBody>
+      </p:sp>
+      <p:sp>
+        <p:nvSpPr>
+          <p:cNvPr id="5" name="Footer Placeholder 4"/>
+          <p:cNvSpPr>
+            <a:spLocks noGrp="1"/>
+          </p:cNvSpPr>
+          <p:nvPr>
+            <p:ph type="ftr" sz="quarter" idx="11"/>
+          </p:nvPr>
+        </p:nvSpPr>
+        <p:spPr/>
+        <p:txBody>
+          <a:bodyPr/>
+          <a:lstStyle/>
+          <a:p>
+            <a:r>
+              <a:rPr lang="en-US" smtClean="0"/>
+              <a:t>(c) 2012 HL7 International</a:t>
+            </a:r>
+            <a:endParaRPr lang="en-US" dirty="0"/>
+          </a:p>
+        </p:txBody>
+      </p:sp>
+      <p:sp>
+        <p:nvSpPr>
+          <p:cNvPr id="6" name="Slide Number Placeholder 5"/>
+          <p:cNvSpPr>
+            <a:spLocks noGrp="1"/>
+          </p:cNvSpPr>
+          <p:nvPr>
+            <p:ph type="sldNum" sz="quarter" idx="12"/>
+          </p:nvPr>
+        </p:nvSpPr>
+        <p:spPr/>
+        <p:txBody>
+          <a:bodyPr/>
+          <a:lstStyle/>
+          <a:p>
+            <a:fld id="{990B41CA-569D-40E7-8E58-026C0338B2C8}" type="slidenum">
+              <a:rPr lang="en-US" smtClean="0"/>
+              <a:pPr/>
+              <a:t>31</a:t>
+            </a:fld>
+            <a:endParaRPr lang="en-US"/>
+          </a:p>
+        </p:txBody>
+      </p:sp>
     </p:spTree>
     <p:extLst>
       <p:ext uri="{BB962C8B-B14F-4D97-AF65-F5344CB8AC3E}">
@@ -7803,6 +9436,76 @@
           </a:p>
         </p:txBody>
       </p:sp>
+      <p:sp>
+        <p:nvSpPr>
+          <p:cNvPr id="4" name="Date Placeholder 3"/>
+          <p:cNvSpPr>
+            <a:spLocks noGrp="1"/>
+          </p:cNvSpPr>
+          <p:nvPr>
+            <p:ph type="dt" sz="half" idx="10"/>
+          </p:nvPr>
+        </p:nvSpPr>
+        <p:spPr/>
+        <p:txBody>
+          <a:bodyPr/>
+          <a:lstStyle/>
+          <a:p>
+            <a:fld id="{66D46ECA-499E-4EE4-AC15-46C73AA22FD5}" type="datetime1">
+              <a:rPr lang="en-US" smtClean="0"/>
+              <a:t>5/22/2012</a:t>
+            </a:fld>
+            <a:endParaRPr lang="en-US"/>
+          </a:p>
+        </p:txBody>
+      </p:sp>
+      <p:sp>
+        <p:nvSpPr>
+          <p:cNvPr id="5" name="Footer Placeholder 4"/>
+          <p:cNvSpPr>
+            <a:spLocks noGrp="1"/>
+          </p:cNvSpPr>
+          <p:nvPr>
+            <p:ph type="ftr" sz="quarter" idx="11"/>
+          </p:nvPr>
+        </p:nvSpPr>
+        <p:spPr/>
+        <p:txBody>
+          <a:bodyPr/>
+          <a:lstStyle/>
+          <a:p>
+            <a:r>
+              <a:rPr lang="en-US" smtClean="0"/>
+              <a:t>(c) 2012 HL7 International</a:t>
+            </a:r>
+            <a:endParaRPr lang="en-US" dirty="0"/>
+          </a:p>
+        </p:txBody>
+      </p:sp>
+      <p:sp>
+        <p:nvSpPr>
+          <p:cNvPr id="6" name="Slide Number Placeholder 5"/>
+          <p:cNvSpPr>
+            <a:spLocks noGrp="1"/>
+          </p:cNvSpPr>
+          <p:nvPr>
+            <p:ph type="sldNum" sz="quarter" idx="12"/>
+          </p:nvPr>
+        </p:nvSpPr>
+        <p:spPr/>
+        <p:txBody>
+          <a:bodyPr/>
+          <a:lstStyle/>
+          <a:p>
+            <a:fld id="{990B41CA-569D-40E7-8E58-026C0338B2C8}" type="slidenum">
+              <a:rPr lang="en-US" smtClean="0"/>
+              <a:pPr/>
+              <a:t>32</a:t>
+            </a:fld>
+            <a:endParaRPr lang="en-US"/>
+          </a:p>
+        </p:txBody>
+      </p:sp>
     </p:spTree>
     <p:extLst>
       <p:ext uri="{BB962C8B-B14F-4D97-AF65-F5344CB8AC3E}">
@@ -7896,6 +9599,76 @@
           </a:p>
         </p:txBody>
       </p:sp>
+      <p:sp>
+        <p:nvSpPr>
+          <p:cNvPr id="4" name="Date Placeholder 3"/>
+          <p:cNvSpPr>
+            <a:spLocks noGrp="1"/>
+          </p:cNvSpPr>
+          <p:nvPr>
+            <p:ph type="dt" sz="half" idx="10"/>
+          </p:nvPr>
+        </p:nvSpPr>
+        <p:spPr/>
+        <p:txBody>
+          <a:bodyPr/>
+          <a:lstStyle/>
+          <a:p>
+            <a:fld id="{2EC1E476-F4A3-489D-8685-BF28EA022DF2}" type="datetime1">
+              <a:rPr lang="en-US" smtClean="0"/>
+              <a:t>5/22/2012</a:t>
+            </a:fld>
+            <a:endParaRPr lang="en-US"/>
+          </a:p>
+        </p:txBody>
+      </p:sp>
+      <p:sp>
+        <p:nvSpPr>
+          <p:cNvPr id="5" name="Footer Placeholder 4"/>
+          <p:cNvSpPr>
+            <a:spLocks noGrp="1"/>
+          </p:cNvSpPr>
+          <p:nvPr>
+            <p:ph type="ftr" sz="quarter" idx="11"/>
+          </p:nvPr>
+        </p:nvSpPr>
+        <p:spPr/>
+        <p:txBody>
+          <a:bodyPr/>
+          <a:lstStyle/>
+          <a:p>
+            <a:r>
+              <a:rPr lang="en-US" smtClean="0"/>
+              <a:t>(c) 2012 HL7 International</a:t>
+            </a:r>
+            <a:endParaRPr lang="en-US" dirty="0"/>
+          </a:p>
+        </p:txBody>
+      </p:sp>
+      <p:sp>
+        <p:nvSpPr>
+          <p:cNvPr id="6" name="Slide Number Placeholder 5"/>
+          <p:cNvSpPr>
+            <a:spLocks noGrp="1"/>
+          </p:cNvSpPr>
+          <p:nvPr>
+            <p:ph type="sldNum" sz="quarter" idx="12"/>
+          </p:nvPr>
+        </p:nvSpPr>
+        <p:spPr/>
+        <p:txBody>
+          <a:bodyPr/>
+          <a:lstStyle/>
+          <a:p>
+            <a:fld id="{990B41CA-569D-40E7-8E58-026C0338B2C8}" type="slidenum">
+              <a:rPr lang="en-US" smtClean="0"/>
+              <a:pPr/>
+              <a:t>33</a:t>
+            </a:fld>
+            <a:endParaRPr lang="en-US"/>
+          </a:p>
+        </p:txBody>
+      </p:sp>
     </p:spTree>
     <p:extLst>
       <p:ext uri="{BB962C8B-B14F-4D97-AF65-F5344CB8AC3E}">
@@ -8017,6 +9790,76 @@
           </a:p>
         </p:txBody>
       </p:sp>
+      <p:sp>
+        <p:nvSpPr>
+          <p:cNvPr id="4" name="Date Placeholder 3"/>
+          <p:cNvSpPr>
+            <a:spLocks noGrp="1"/>
+          </p:cNvSpPr>
+          <p:nvPr>
+            <p:ph type="dt" sz="half" idx="10"/>
+          </p:nvPr>
+        </p:nvSpPr>
+        <p:spPr/>
+        <p:txBody>
+          <a:bodyPr/>
+          <a:lstStyle/>
+          <a:p>
+            <a:fld id="{0BA9D9DF-CC49-4A00-B87A-A6DD448079F9}" type="datetime1">
+              <a:rPr lang="en-US" smtClean="0"/>
+              <a:t>5/22/2012</a:t>
+            </a:fld>
+            <a:endParaRPr lang="en-US"/>
+          </a:p>
+        </p:txBody>
+      </p:sp>
+      <p:sp>
+        <p:nvSpPr>
+          <p:cNvPr id="5" name="Footer Placeholder 4"/>
+          <p:cNvSpPr>
+            <a:spLocks noGrp="1"/>
+          </p:cNvSpPr>
+          <p:nvPr>
+            <p:ph type="ftr" sz="quarter" idx="11"/>
+          </p:nvPr>
+        </p:nvSpPr>
+        <p:spPr/>
+        <p:txBody>
+          <a:bodyPr/>
+          <a:lstStyle/>
+          <a:p>
+            <a:r>
+              <a:rPr lang="en-US" smtClean="0"/>
+              <a:t>(c) 2012 HL7 International</a:t>
+            </a:r>
+            <a:endParaRPr lang="en-US" dirty="0"/>
+          </a:p>
+        </p:txBody>
+      </p:sp>
+      <p:sp>
+        <p:nvSpPr>
+          <p:cNvPr id="6" name="Slide Number Placeholder 5"/>
+          <p:cNvSpPr>
+            <a:spLocks noGrp="1"/>
+          </p:cNvSpPr>
+          <p:nvPr>
+            <p:ph type="sldNum" sz="quarter" idx="12"/>
+          </p:nvPr>
+        </p:nvSpPr>
+        <p:spPr/>
+        <p:txBody>
+          <a:bodyPr/>
+          <a:lstStyle/>
+          <a:p>
+            <a:fld id="{990B41CA-569D-40E7-8E58-026C0338B2C8}" type="slidenum">
+              <a:rPr lang="en-US" smtClean="0"/>
+              <a:pPr/>
+              <a:t>34</a:t>
+            </a:fld>
+            <a:endParaRPr lang="en-US"/>
+          </a:p>
+        </p:txBody>
+      </p:sp>
     </p:spTree>
     <p:extLst>
       <p:ext uri="{BB962C8B-B14F-4D97-AF65-F5344CB8AC3E}">
@@ -8093,6 +9936,76 @@
           </a:p>
         </p:txBody>
       </p:sp>
+      <p:sp>
+        <p:nvSpPr>
+          <p:cNvPr id="4" name="Date Placeholder 3"/>
+          <p:cNvSpPr>
+            <a:spLocks noGrp="1"/>
+          </p:cNvSpPr>
+          <p:nvPr>
+            <p:ph type="dt" sz="half" idx="10"/>
+          </p:nvPr>
+        </p:nvSpPr>
+        <p:spPr/>
+        <p:txBody>
+          <a:bodyPr/>
+          <a:lstStyle/>
+          <a:p>
+            <a:fld id="{D5E76CD0-7DBE-4D02-85DE-D3A9EA270134}" type="datetime1">
+              <a:rPr lang="en-US" smtClean="0"/>
+              <a:t>5/22/2012</a:t>
+            </a:fld>
+            <a:endParaRPr lang="en-US"/>
+          </a:p>
+        </p:txBody>
+      </p:sp>
+      <p:sp>
+        <p:nvSpPr>
+          <p:cNvPr id="5" name="Footer Placeholder 4"/>
+          <p:cNvSpPr>
+            <a:spLocks noGrp="1"/>
+          </p:cNvSpPr>
+          <p:nvPr>
+            <p:ph type="ftr" sz="quarter" idx="11"/>
+          </p:nvPr>
+        </p:nvSpPr>
+        <p:spPr/>
+        <p:txBody>
+          <a:bodyPr/>
+          <a:lstStyle/>
+          <a:p>
+            <a:r>
+              <a:rPr lang="en-US" smtClean="0"/>
+              <a:t>(c) 2012 HL7 International</a:t>
+            </a:r>
+            <a:endParaRPr lang="en-US" dirty="0"/>
+          </a:p>
+        </p:txBody>
+      </p:sp>
+      <p:sp>
+        <p:nvSpPr>
+          <p:cNvPr id="6" name="Slide Number Placeholder 5"/>
+          <p:cNvSpPr>
+            <a:spLocks noGrp="1"/>
+          </p:cNvSpPr>
+          <p:nvPr>
+            <p:ph type="sldNum" sz="quarter" idx="12"/>
+          </p:nvPr>
+        </p:nvSpPr>
+        <p:spPr/>
+        <p:txBody>
+          <a:bodyPr/>
+          <a:lstStyle/>
+          <a:p>
+            <a:fld id="{990B41CA-569D-40E7-8E58-026C0338B2C8}" type="slidenum">
+              <a:rPr lang="en-US" smtClean="0"/>
+              <a:pPr/>
+              <a:t>35</a:t>
+            </a:fld>
+            <a:endParaRPr lang="en-US"/>
+          </a:p>
+        </p:txBody>
+      </p:sp>
     </p:spTree>
     <p:extLst>
       <p:ext uri="{BB962C8B-B14F-4D97-AF65-F5344CB8AC3E}">
@@ -8146,6 +10059,76 @@
           </a:p>
         </p:txBody>
       </p:sp>
+      <p:sp>
+        <p:nvSpPr>
+          <p:cNvPr id="2" name="Date Placeholder 1"/>
+          <p:cNvSpPr>
+            <a:spLocks noGrp="1"/>
+          </p:cNvSpPr>
+          <p:nvPr>
+            <p:ph type="dt" sz="half" idx="10"/>
+          </p:nvPr>
+        </p:nvSpPr>
+        <p:spPr/>
+        <p:txBody>
+          <a:bodyPr/>
+          <a:lstStyle/>
+          <a:p>
+            <a:fld id="{E30CE0EA-4D1D-43AB-B08A-B60C749D47CE}" type="datetime1">
+              <a:rPr lang="en-US" smtClean="0"/>
+              <a:t>5/22/2012</a:t>
+            </a:fld>
+            <a:endParaRPr lang="en-US"/>
+          </a:p>
+        </p:txBody>
+      </p:sp>
+      <p:sp>
+        <p:nvSpPr>
+          <p:cNvPr id="3" name="Footer Placeholder 2"/>
+          <p:cNvSpPr>
+            <a:spLocks noGrp="1"/>
+          </p:cNvSpPr>
+          <p:nvPr>
+            <p:ph type="ftr" sz="quarter" idx="11"/>
+          </p:nvPr>
+        </p:nvSpPr>
+        <p:spPr/>
+        <p:txBody>
+          <a:bodyPr/>
+          <a:lstStyle/>
+          <a:p>
+            <a:r>
+              <a:rPr lang="en-US" smtClean="0"/>
+              <a:t>(c) 2012 HL7 International</a:t>
+            </a:r>
+            <a:endParaRPr lang="en-US"/>
+          </a:p>
+        </p:txBody>
+      </p:sp>
+      <p:sp>
+        <p:nvSpPr>
+          <p:cNvPr id="4" name="Slide Number Placeholder 3"/>
+          <p:cNvSpPr>
+            <a:spLocks noGrp="1"/>
+          </p:cNvSpPr>
+          <p:nvPr>
+            <p:ph type="sldNum" sz="quarter" idx="12"/>
+          </p:nvPr>
+        </p:nvSpPr>
+        <p:spPr/>
+        <p:txBody>
+          <a:bodyPr/>
+          <a:lstStyle/>
+          <a:p>
+            <a:fld id="{990B41CA-569D-40E7-8E58-026C0338B2C8}" type="slidenum">
+              <a:rPr lang="en-US" smtClean="0"/>
+              <a:pPr/>
+              <a:t>36</a:t>
+            </a:fld>
+            <a:endParaRPr lang="en-US"/>
+          </a:p>
+        </p:txBody>
+      </p:sp>
     </p:spTree>
     <p:extLst>
       <p:ext uri="{BB962C8B-B14F-4D97-AF65-F5344CB8AC3E}">
@@ -8263,6 +10246,76 @@
           </a:p>
         </p:txBody>
       </p:sp>
+      <p:sp>
+        <p:nvSpPr>
+          <p:cNvPr id="4" name="Date Placeholder 3"/>
+          <p:cNvSpPr>
+            <a:spLocks noGrp="1"/>
+          </p:cNvSpPr>
+          <p:nvPr>
+            <p:ph type="dt" sz="half" idx="10"/>
+          </p:nvPr>
+        </p:nvSpPr>
+        <p:spPr/>
+        <p:txBody>
+          <a:bodyPr/>
+          <a:lstStyle/>
+          <a:p>
+            <a:fld id="{DA25CE4A-0768-4C39-ABA3-B9B52F0F0513}" type="datetime1">
+              <a:rPr lang="en-US" smtClean="0"/>
+              <a:t>5/22/2012</a:t>
+            </a:fld>
+            <a:endParaRPr lang="en-US"/>
+          </a:p>
+        </p:txBody>
+      </p:sp>
+      <p:sp>
+        <p:nvSpPr>
+          <p:cNvPr id="5" name="Footer Placeholder 4"/>
+          <p:cNvSpPr>
+            <a:spLocks noGrp="1"/>
+          </p:cNvSpPr>
+          <p:nvPr>
+            <p:ph type="ftr" sz="quarter" idx="11"/>
+          </p:nvPr>
+        </p:nvSpPr>
+        <p:spPr/>
+        <p:txBody>
+          <a:bodyPr/>
+          <a:lstStyle/>
+          <a:p>
+            <a:r>
+              <a:rPr lang="en-US" smtClean="0"/>
+              <a:t>(c) 2012 HL7 International</a:t>
+            </a:r>
+            <a:endParaRPr lang="en-US" dirty="0"/>
+          </a:p>
+        </p:txBody>
+      </p:sp>
+      <p:sp>
+        <p:nvSpPr>
+          <p:cNvPr id="6" name="Slide Number Placeholder 5"/>
+          <p:cNvSpPr>
+            <a:spLocks noGrp="1"/>
+          </p:cNvSpPr>
+          <p:nvPr>
+            <p:ph type="sldNum" sz="quarter" idx="12"/>
+          </p:nvPr>
+        </p:nvSpPr>
+        <p:spPr/>
+        <p:txBody>
+          <a:bodyPr/>
+          <a:lstStyle/>
+          <a:p>
+            <a:fld id="{990B41CA-569D-40E7-8E58-026C0338B2C8}" type="slidenum">
+              <a:rPr lang="en-US" smtClean="0"/>
+              <a:pPr/>
+              <a:t>37</a:t>
+            </a:fld>
+            <a:endParaRPr lang="en-US"/>
+          </a:p>
+        </p:txBody>
+      </p:sp>
     </p:spTree>
     <p:extLst>
       <p:ext uri="{BB962C8B-B14F-4D97-AF65-F5344CB8AC3E}">
@@ -8364,6 +10417,76 @@
           </a:p>
         </p:txBody>
       </p:sp>
+      <p:sp>
+        <p:nvSpPr>
+          <p:cNvPr id="4" name="Date Placeholder 3"/>
+          <p:cNvSpPr>
+            <a:spLocks noGrp="1"/>
+          </p:cNvSpPr>
+          <p:nvPr>
+            <p:ph type="dt" sz="half" idx="10"/>
+          </p:nvPr>
+        </p:nvSpPr>
+        <p:spPr/>
+        <p:txBody>
+          <a:bodyPr/>
+          <a:lstStyle/>
+          <a:p>
+            <a:fld id="{64B7A845-FF15-46C6-A943-689363CC0073}" type="datetime1">
+              <a:rPr lang="en-US" smtClean="0"/>
+              <a:t>5/22/2012</a:t>
+            </a:fld>
+            <a:endParaRPr lang="en-US"/>
+          </a:p>
+        </p:txBody>
+      </p:sp>
+      <p:sp>
+        <p:nvSpPr>
+          <p:cNvPr id="5" name="Footer Placeholder 4"/>
+          <p:cNvSpPr>
+            <a:spLocks noGrp="1"/>
+          </p:cNvSpPr>
+          <p:nvPr>
+            <p:ph type="ftr" sz="quarter" idx="11"/>
+          </p:nvPr>
+        </p:nvSpPr>
+        <p:spPr/>
+        <p:txBody>
+          <a:bodyPr/>
+          <a:lstStyle/>
+          <a:p>
+            <a:r>
+              <a:rPr lang="en-US" smtClean="0"/>
+              <a:t>(c) 2012 HL7 International</a:t>
+            </a:r>
+            <a:endParaRPr lang="en-US" dirty="0"/>
+          </a:p>
+        </p:txBody>
+      </p:sp>
+      <p:sp>
+        <p:nvSpPr>
+          <p:cNvPr id="6" name="Slide Number Placeholder 5"/>
+          <p:cNvSpPr>
+            <a:spLocks noGrp="1"/>
+          </p:cNvSpPr>
+          <p:nvPr>
+            <p:ph type="sldNum" sz="quarter" idx="12"/>
+          </p:nvPr>
+        </p:nvSpPr>
+        <p:spPr/>
+        <p:txBody>
+          <a:bodyPr/>
+          <a:lstStyle/>
+          <a:p>
+            <a:fld id="{990B41CA-569D-40E7-8E58-026C0338B2C8}" type="slidenum">
+              <a:rPr lang="en-US" smtClean="0"/>
+              <a:pPr/>
+              <a:t>38</a:t>
+            </a:fld>
+            <a:endParaRPr lang="en-US"/>
+          </a:p>
+        </p:txBody>
+      </p:sp>
     </p:spTree>
     <p:extLst>
       <p:ext uri="{BB962C8B-B14F-4D97-AF65-F5344CB8AC3E}">
@@ -8461,6 +10584,76 @@
           </a:p>
         </p:txBody>
       </p:sp>
+      <p:sp>
+        <p:nvSpPr>
+          <p:cNvPr id="4" name="Date Placeholder 3"/>
+          <p:cNvSpPr>
+            <a:spLocks noGrp="1"/>
+          </p:cNvSpPr>
+          <p:nvPr>
+            <p:ph type="dt" sz="half" idx="10"/>
+          </p:nvPr>
+        </p:nvSpPr>
+        <p:spPr/>
+        <p:txBody>
+          <a:bodyPr/>
+          <a:lstStyle/>
+          <a:p>
+            <a:fld id="{C9FB9974-63EF-45DA-A80B-3BBA5465F0F9}" type="datetime1">
+              <a:rPr lang="en-US" smtClean="0"/>
+              <a:t>5/22/2012</a:t>
+            </a:fld>
+            <a:endParaRPr lang="en-US"/>
+          </a:p>
+        </p:txBody>
+      </p:sp>
+      <p:sp>
+        <p:nvSpPr>
+          <p:cNvPr id="5" name="Footer Placeholder 4"/>
+          <p:cNvSpPr>
+            <a:spLocks noGrp="1"/>
+          </p:cNvSpPr>
+          <p:nvPr>
+            <p:ph type="ftr" sz="quarter" idx="11"/>
+          </p:nvPr>
+        </p:nvSpPr>
+        <p:spPr/>
+        <p:txBody>
+          <a:bodyPr/>
+          <a:lstStyle/>
+          <a:p>
+            <a:r>
+              <a:rPr lang="en-US" smtClean="0"/>
+              <a:t>(c) 2012 HL7 International</a:t>
+            </a:r>
+            <a:endParaRPr lang="en-US" dirty="0"/>
+          </a:p>
+        </p:txBody>
+      </p:sp>
+      <p:sp>
+        <p:nvSpPr>
+          <p:cNvPr id="6" name="Slide Number Placeholder 5"/>
+          <p:cNvSpPr>
+            <a:spLocks noGrp="1"/>
+          </p:cNvSpPr>
+          <p:nvPr>
+            <p:ph type="sldNum" sz="quarter" idx="12"/>
+          </p:nvPr>
+        </p:nvSpPr>
+        <p:spPr/>
+        <p:txBody>
+          <a:bodyPr/>
+          <a:lstStyle/>
+          <a:p>
+            <a:fld id="{990B41CA-569D-40E7-8E58-026C0338B2C8}" type="slidenum">
+              <a:rPr lang="en-US" smtClean="0"/>
+              <a:pPr/>
+              <a:t>39</a:t>
+            </a:fld>
+            <a:endParaRPr lang="en-US"/>
+          </a:p>
+        </p:txBody>
+      </p:sp>
     </p:spTree>
     <p:extLst>
       <p:ext uri="{BB962C8B-B14F-4D97-AF65-F5344CB8AC3E}">
@@ -8551,6 +10744,76 @@
               <a:rPr lang="en-US" dirty="0" smtClean="0"/>
               <a:t>Much of what we tell you could change, at least somewhat, before it is stable</a:t>
             </a:r>
+          </a:p>
+        </p:txBody>
+      </p:sp>
+      <p:sp>
+        <p:nvSpPr>
+          <p:cNvPr id="4" name="Date Placeholder 3"/>
+          <p:cNvSpPr>
+            <a:spLocks noGrp="1"/>
+          </p:cNvSpPr>
+          <p:nvPr>
+            <p:ph type="dt" sz="half" idx="10"/>
+          </p:nvPr>
+        </p:nvSpPr>
+        <p:spPr/>
+        <p:txBody>
+          <a:bodyPr/>
+          <a:lstStyle/>
+          <a:p>
+            <a:fld id="{C8B8A534-C63B-437B-95B4-C95CA7933EB1}" type="datetime1">
+              <a:rPr lang="en-US" smtClean="0"/>
+              <a:t>5/22/2012</a:t>
+            </a:fld>
+            <a:endParaRPr lang="en-US"/>
+          </a:p>
+        </p:txBody>
+      </p:sp>
+      <p:sp>
+        <p:nvSpPr>
+          <p:cNvPr id="5" name="Footer Placeholder 4"/>
+          <p:cNvSpPr>
+            <a:spLocks noGrp="1"/>
+          </p:cNvSpPr>
+          <p:nvPr>
+            <p:ph type="ftr" sz="quarter" idx="11"/>
+          </p:nvPr>
+        </p:nvSpPr>
+        <p:spPr/>
+        <p:txBody>
+          <a:bodyPr/>
+          <a:lstStyle/>
+          <a:p>
+            <a:r>
+              <a:rPr lang="en-US" smtClean="0"/>
+              <a:t>(c) 2012 HL7 International</a:t>
+            </a:r>
+            <a:endParaRPr lang="en-US" dirty="0"/>
+          </a:p>
+        </p:txBody>
+      </p:sp>
+      <p:sp>
+        <p:nvSpPr>
+          <p:cNvPr id="6" name="Slide Number Placeholder 5"/>
+          <p:cNvSpPr>
+            <a:spLocks noGrp="1"/>
+          </p:cNvSpPr>
+          <p:nvPr>
+            <p:ph type="sldNum" sz="quarter" idx="12"/>
+          </p:nvPr>
+        </p:nvSpPr>
+        <p:spPr/>
+        <p:txBody>
+          <a:bodyPr/>
+          <a:lstStyle/>
+          <a:p>
+            <a:fld id="{990B41CA-569D-40E7-8E58-026C0338B2C8}" type="slidenum">
+              <a:rPr lang="en-US" smtClean="0"/>
+              <a:pPr/>
+              <a:t>4</a:t>
+            </a:fld>
+            <a:endParaRPr lang="en-US"/>
           </a:p>
         </p:txBody>
       </p:sp>
@@ -8718,6 +10981,76 @@
           </a:p>
         </p:txBody>
       </p:sp>
+      <p:sp>
+        <p:nvSpPr>
+          <p:cNvPr id="4" name="Date Placeholder 3"/>
+          <p:cNvSpPr>
+            <a:spLocks noGrp="1"/>
+          </p:cNvSpPr>
+          <p:nvPr>
+            <p:ph type="dt" sz="half" idx="10"/>
+          </p:nvPr>
+        </p:nvSpPr>
+        <p:spPr/>
+        <p:txBody>
+          <a:bodyPr/>
+          <a:lstStyle/>
+          <a:p>
+            <a:fld id="{9D000E22-2DF7-41BE-ABFD-F84D3D930A32}" type="datetime1">
+              <a:rPr lang="en-US" smtClean="0"/>
+              <a:t>5/22/2012</a:t>
+            </a:fld>
+            <a:endParaRPr lang="en-US"/>
+          </a:p>
+        </p:txBody>
+      </p:sp>
+      <p:sp>
+        <p:nvSpPr>
+          <p:cNvPr id="5" name="Footer Placeholder 4"/>
+          <p:cNvSpPr>
+            <a:spLocks noGrp="1"/>
+          </p:cNvSpPr>
+          <p:nvPr>
+            <p:ph type="ftr" sz="quarter" idx="11"/>
+          </p:nvPr>
+        </p:nvSpPr>
+        <p:spPr/>
+        <p:txBody>
+          <a:bodyPr/>
+          <a:lstStyle/>
+          <a:p>
+            <a:r>
+              <a:rPr lang="en-US" smtClean="0"/>
+              <a:t>(c) 2012 HL7 International</a:t>
+            </a:r>
+            <a:endParaRPr lang="en-US" dirty="0"/>
+          </a:p>
+        </p:txBody>
+      </p:sp>
+      <p:sp>
+        <p:nvSpPr>
+          <p:cNvPr id="6" name="Slide Number Placeholder 5"/>
+          <p:cNvSpPr>
+            <a:spLocks noGrp="1"/>
+          </p:cNvSpPr>
+          <p:nvPr>
+            <p:ph type="sldNum" sz="quarter" idx="12"/>
+          </p:nvPr>
+        </p:nvSpPr>
+        <p:spPr/>
+        <p:txBody>
+          <a:bodyPr/>
+          <a:lstStyle/>
+          <a:p>
+            <a:fld id="{990B41CA-569D-40E7-8E58-026C0338B2C8}" type="slidenum">
+              <a:rPr lang="en-US" smtClean="0"/>
+              <a:pPr/>
+              <a:t>40</a:t>
+            </a:fld>
+            <a:endParaRPr lang="en-US"/>
+          </a:p>
+        </p:txBody>
+      </p:sp>
     </p:spTree>
     <p:extLst>
       <p:ext uri="{BB962C8B-B14F-4D97-AF65-F5344CB8AC3E}">
@@ -8768,6 +11101,76 @@
               <a:t>Questions &amp; Answers</a:t>
             </a:r>
             <a:endParaRPr lang="en-CA" dirty="0"/>
+          </a:p>
+        </p:txBody>
+      </p:sp>
+      <p:sp>
+        <p:nvSpPr>
+          <p:cNvPr id="2" name="Date Placeholder 1"/>
+          <p:cNvSpPr>
+            <a:spLocks noGrp="1"/>
+          </p:cNvSpPr>
+          <p:nvPr>
+            <p:ph type="dt" sz="half" idx="10"/>
+          </p:nvPr>
+        </p:nvSpPr>
+        <p:spPr/>
+        <p:txBody>
+          <a:bodyPr/>
+          <a:lstStyle/>
+          <a:p>
+            <a:fld id="{A6077BAA-F63D-4381-9E5B-E28282E7AB39}" type="datetime1">
+              <a:rPr lang="en-US" smtClean="0"/>
+              <a:t>5/22/2012</a:t>
+            </a:fld>
+            <a:endParaRPr lang="en-US"/>
+          </a:p>
+        </p:txBody>
+      </p:sp>
+      <p:sp>
+        <p:nvSpPr>
+          <p:cNvPr id="3" name="Footer Placeholder 2"/>
+          <p:cNvSpPr>
+            <a:spLocks noGrp="1"/>
+          </p:cNvSpPr>
+          <p:nvPr>
+            <p:ph type="ftr" sz="quarter" idx="11"/>
+          </p:nvPr>
+        </p:nvSpPr>
+        <p:spPr/>
+        <p:txBody>
+          <a:bodyPr/>
+          <a:lstStyle/>
+          <a:p>
+            <a:r>
+              <a:rPr lang="en-US" smtClean="0"/>
+              <a:t>(c) 2012 HL7 International</a:t>
+            </a:r>
+            <a:endParaRPr lang="en-US"/>
+          </a:p>
+        </p:txBody>
+      </p:sp>
+      <p:sp>
+        <p:nvSpPr>
+          <p:cNvPr id="4" name="Slide Number Placeholder 3"/>
+          <p:cNvSpPr>
+            <a:spLocks noGrp="1"/>
+          </p:cNvSpPr>
+          <p:nvPr>
+            <p:ph type="sldNum" sz="quarter" idx="12"/>
+          </p:nvPr>
+        </p:nvSpPr>
+        <p:spPr/>
+        <p:txBody>
+          <a:bodyPr/>
+          <a:lstStyle/>
+          <a:p>
+            <a:fld id="{990B41CA-569D-40E7-8E58-026C0338B2C8}" type="slidenum">
+              <a:rPr lang="en-US" smtClean="0"/>
+              <a:pPr/>
+              <a:t>41</a:t>
+            </a:fld>
+            <a:endParaRPr lang="en-US"/>
           </a:p>
         </p:txBody>
       </p:sp>
@@ -8869,6 +11272,76 @@
           </a:p>
         </p:txBody>
       </p:sp>
+      <p:sp>
+        <p:nvSpPr>
+          <p:cNvPr id="4" name="Date Placeholder 3"/>
+          <p:cNvSpPr>
+            <a:spLocks noGrp="1"/>
+          </p:cNvSpPr>
+          <p:nvPr>
+            <p:ph type="dt" sz="half" idx="10"/>
+          </p:nvPr>
+        </p:nvSpPr>
+        <p:spPr/>
+        <p:txBody>
+          <a:bodyPr/>
+          <a:lstStyle/>
+          <a:p>
+            <a:fld id="{6E75EA05-7F55-4AB8-B3DB-57A6BDD24DD1}" type="datetime1">
+              <a:rPr lang="en-US" smtClean="0"/>
+              <a:t>5/22/2012</a:t>
+            </a:fld>
+            <a:endParaRPr lang="en-US"/>
+          </a:p>
+        </p:txBody>
+      </p:sp>
+      <p:sp>
+        <p:nvSpPr>
+          <p:cNvPr id="5" name="Footer Placeholder 4"/>
+          <p:cNvSpPr>
+            <a:spLocks noGrp="1"/>
+          </p:cNvSpPr>
+          <p:nvPr>
+            <p:ph type="ftr" sz="quarter" idx="11"/>
+          </p:nvPr>
+        </p:nvSpPr>
+        <p:spPr/>
+        <p:txBody>
+          <a:bodyPr/>
+          <a:lstStyle/>
+          <a:p>
+            <a:r>
+              <a:rPr lang="en-US" smtClean="0"/>
+              <a:t>(c) 2012 HL7 International</a:t>
+            </a:r>
+            <a:endParaRPr lang="en-US" dirty="0"/>
+          </a:p>
+        </p:txBody>
+      </p:sp>
+      <p:sp>
+        <p:nvSpPr>
+          <p:cNvPr id="6" name="Slide Number Placeholder 5"/>
+          <p:cNvSpPr>
+            <a:spLocks noGrp="1"/>
+          </p:cNvSpPr>
+          <p:nvPr>
+            <p:ph type="sldNum" sz="quarter" idx="12"/>
+          </p:nvPr>
+        </p:nvSpPr>
+        <p:spPr/>
+        <p:txBody>
+          <a:bodyPr/>
+          <a:lstStyle/>
+          <a:p>
+            <a:fld id="{990B41CA-569D-40E7-8E58-026C0338B2C8}" type="slidenum">
+              <a:rPr lang="en-US" smtClean="0"/>
+              <a:pPr/>
+              <a:t>42</a:t>
+            </a:fld>
+            <a:endParaRPr lang="en-US"/>
+          </a:p>
+        </p:txBody>
+      </p:sp>
     </p:spTree>
     <p:extLst>
       <p:ext uri="{BB962C8B-B14F-4D97-AF65-F5344CB8AC3E}">
@@ -8991,10 +11464,273 @@
           </a:p>
         </p:txBody>
       </p:sp>
+      <p:sp>
+        <p:nvSpPr>
+          <p:cNvPr id="4" name="Date Placeholder 3"/>
+          <p:cNvSpPr>
+            <a:spLocks noGrp="1"/>
+          </p:cNvSpPr>
+          <p:nvPr>
+            <p:ph type="dt" sz="half" idx="10"/>
+          </p:nvPr>
+        </p:nvSpPr>
+        <p:spPr/>
+        <p:txBody>
+          <a:bodyPr/>
+          <a:lstStyle/>
+          <a:p>
+            <a:fld id="{2B809EF0-48D5-41D9-AEFC-73ACBBAE6D93}" type="datetime1">
+              <a:rPr lang="en-US" smtClean="0"/>
+              <a:t>5/22/2012</a:t>
+            </a:fld>
+            <a:endParaRPr lang="en-US"/>
+          </a:p>
+        </p:txBody>
+      </p:sp>
+      <p:sp>
+        <p:nvSpPr>
+          <p:cNvPr id="5" name="Footer Placeholder 4"/>
+          <p:cNvSpPr>
+            <a:spLocks noGrp="1"/>
+          </p:cNvSpPr>
+          <p:nvPr>
+            <p:ph type="ftr" sz="quarter" idx="11"/>
+          </p:nvPr>
+        </p:nvSpPr>
+        <p:spPr/>
+        <p:txBody>
+          <a:bodyPr/>
+          <a:lstStyle/>
+          <a:p>
+            <a:r>
+              <a:rPr lang="en-US" smtClean="0"/>
+              <a:t>(c) 2012 HL7 International</a:t>
+            </a:r>
+            <a:endParaRPr lang="en-US" dirty="0"/>
+          </a:p>
+        </p:txBody>
+      </p:sp>
+      <p:sp>
+        <p:nvSpPr>
+          <p:cNvPr id="6" name="Slide Number Placeholder 5"/>
+          <p:cNvSpPr>
+            <a:spLocks noGrp="1"/>
+          </p:cNvSpPr>
+          <p:nvPr>
+            <p:ph type="sldNum" sz="quarter" idx="12"/>
+          </p:nvPr>
+        </p:nvSpPr>
+        <p:spPr/>
+        <p:txBody>
+          <a:bodyPr/>
+          <a:lstStyle/>
+          <a:p>
+            <a:fld id="{990B41CA-569D-40E7-8E58-026C0338B2C8}" type="slidenum">
+              <a:rPr lang="en-US" smtClean="0"/>
+              <a:pPr/>
+              <a:t>43</a:t>
+            </a:fld>
+            <a:endParaRPr lang="en-US"/>
+          </a:p>
+        </p:txBody>
+      </p:sp>
     </p:spTree>
     <p:extLst>
       <p:ext uri="{BB962C8B-B14F-4D97-AF65-F5344CB8AC3E}">
         <p14:creationId xmlns:p14="http://schemas.microsoft.com/office/powerpoint/2010/main" val="318220665"/>
+      </p:ext>
+    </p:extLst>
+  </p:cSld>
+  <p:clrMapOvr>
+    <a:masterClrMapping/>
+  </p:clrMapOvr>
+</p:sld>
+</file>
+
+<file path=ppt/slides/slide44.xml><?xml version="1.0" encoding="utf-8"?>
+<p:sld xmlns:a="http://schemas.openxmlformats.org/drawingml/2006/main" xmlns:r="http://schemas.openxmlformats.org/officeDocument/2006/relationships" xmlns:p="http://schemas.openxmlformats.org/presentationml/2006/main">
+  <p:cSld>
+    <p:spTree>
+      <p:nvGrpSpPr>
+        <p:cNvPr id="1" name=""/>
+        <p:cNvGrpSpPr/>
+        <p:nvPr/>
+      </p:nvGrpSpPr>
+      <p:grpSpPr>
+        <a:xfrm>
+          <a:off x="0" y="0"/>
+          <a:ext cx="0" cy="0"/>
+          <a:chOff x="0" y="0"/>
+          <a:chExt cx="0" cy="0"/>
+        </a:xfrm>
+      </p:grpSpPr>
+      <p:sp>
+        <p:nvSpPr>
+          <p:cNvPr id="2" name="Title 1"/>
+          <p:cNvSpPr>
+            <a:spLocks noGrp="1"/>
+          </p:cNvSpPr>
+          <p:nvPr>
+            <p:ph type="title"/>
+          </p:nvPr>
+        </p:nvSpPr>
+        <p:spPr/>
+        <p:txBody>
+          <a:bodyPr/>
+          <a:lstStyle/>
+          <a:p>
+            <a:r>
+              <a:rPr lang="en-US" dirty="0" smtClean="0"/>
+              <a:t>Licensing and Attribution</a:t>
+            </a:r>
+            <a:endParaRPr lang="en-CA" dirty="0"/>
+          </a:p>
+        </p:txBody>
+      </p:sp>
+      <p:sp>
+        <p:nvSpPr>
+          <p:cNvPr id="3" name="Content Placeholder 2"/>
+          <p:cNvSpPr>
+            <a:spLocks noGrp="1"/>
+          </p:cNvSpPr>
+          <p:nvPr>
+            <p:ph idx="1"/>
+          </p:nvPr>
+        </p:nvSpPr>
+        <p:spPr/>
+        <p:txBody>
+          <a:bodyPr/>
+          <a:lstStyle/>
+          <a:p>
+            <a:r>
+              <a:rPr lang="en-US" dirty="0" smtClean="0"/>
+              <a:t>This presentation is copyright to HL7 International</a:t>
+            </a:r>
+          </a:p>
+          <a:p>
+            <a:r>
+              <a:rPr lang="en-US" dirty="0" smtClean="0"/>
+              <a:t>It is licensed under the </a:t>
+            </a:r>
+            <a:r>
+              <a:rPr lang="en-US" dirty="0" smtClean="0">
+                <a:solidFill>
+                  <a:srgbClr val="0070C0"/>
+                </a:solidFill>
+              </a:rPr>
+              <a:t>Creative Commons Attribution Non-commercial Share Alike 3.0</a:t>
+            </a:r>
+            <a:r>
+              <a:rPr lang="en-US" dirty="0" smtClean="0"/>
+              <a:t> license</a:t>
+            </a:r>
+          </a:p>
+          <a:p>
+            <a:pPr lvl="1"/>
+            <a:r>
+              <a:rPr lang="en-US" dirty="0" smtClean="0"/>
+              <a:t>Details can be found here:</a:t>
+            </a:r>
+          </a:p>
+          <a:p>
+            <a:pPr lvl="2"/>
+            <a:r>
+              <a:rPr lang="en-US" dirty="0">
+                <a:hlinkClick r:id="rId2"/>
+              </a:rPr>
+              <a:t>http://creativecommons.org/licenses/by-nc-sa/3.0</a:t>
+            </a:r>
+            <a:r>
+              <a:rPr lang="en-US" dirty="0" smtClean="0">
+                <a:hlinkClick r:id="rId2"/>
+              </a:rPr>
+              <a:t>/</a:t>
+            </a:r>
+            <a:endParaRPr lang="en-US" dirty="0" smtClean="0"/>
+          </a:p>
+          <a:p>
+            <a:r>
+              <a:rPr lang="en-US" dirty="0" smtClean="0"/>
+              <a:t>The background image is sourced from quality3dmodels.net under the same license terms.</a:t>
+            </a:r>
+            <a:endParaRPr lang="en-CA" dirty="0"/>
+          </a:p>
+        </p:txBody>
+      </p:sp>
+      <p:sp>
+        <p:nvSpPr>
+          <p:cNvPr id="4" name="Slide Number Placeholder 3"/>
+          <p:cNvSpPr>
+            <a:spLocks noGrp="1"/>
+          </p:cNvSpPr>
+          <p:nvPr>
+            <p:ph type="sldNum" sz="quarter" idx="12"/>
+          </p:nvPr>
+        </p:nvSpPr>
+        <p:spPr/>
+        <p:txBody>
+          <a:bodyPr/>
+          <a:lstStyle/>
+          <a:p>
+            <a:fld id="{990B41CA-569D-40E7-8E58-026C0338B2C8}" type="slidenum">
+              <a:rPr lang="en-US" smtClean="0"/>
+              <a:pPr/>
+              <a:t>44</a:t>
+            </a:fld>
+            <a:endParaRPr lang="en-US"/>
+          </a:p>
+        </p:txBody>
+      </p:sp>
+      <p:sp>
+        <p:nvSpPr>
+          <p:cNvPr id="5" name="Footer Placeholder 4"/>
+          <p:cNvSpPr>
+            <a:spLocks noGrp="1"/>
+          </p:cNvSpPr>
+          <p:nvPr>
+            <p:ph type="ftr" sz="quarter" idx="11"/>
+          </p:nvPr>
+        </p:nvSpPr>
+        <p:spPr/>
+        <p:txBody>
+          <a:bodyPr/>
+          <a:lstStyle/>
+          <a:p>
+            <a:r>
+              <a:rPr lang="en-US" smtClean="0"/>
+              <a:t>(c) 2012 HL7 International</a:t>
+            </a:r>
+            <a:endParaRPr lang="en-US" dirty="0"/>
+          </a:p>
+        </p:txBody>
+      </p:sp>
+      <p:sp>
+        <p:nvSpPr>
+          <p:cNvPr id="6" name="Date Placeholder 5"/>
+          <p:cNvSpPr>
+            <a:spLocks noGrp="1"/>
+          </p:cNvSpPr>
+          <p:nvPr>
+            <p:ph type="dt" sz="half" idx="10"/>
+          </p:nvPr>
+        </p:nvSpPr>
+        <p:spPr/>
+        <p:txBody>
+          <a:bodyPr/>
+          <a:lstStyle/>
+          <a:p>
+            <a:fld id="{3E35911F-C29B-46BC-A997-389E14454876}" type="datetime1">
+              <a:rPr lang="en-US" smtClean="0"/>
+              <a:t>5/22/2012</a:t>
+            </a:fld>
+            <a:endParaRPr lang="en-US"/>
+          </a:p>
+        </p:txBody>
+      </p:sp>
+    </p:spTree>
+    <p:extLst>
+      <p:ext uri="{BB962C8B-B14F-4D97-AF65-F5344CB8AC3E}">
+        <p14:creationId xmlns:p14="http://schemas.microsoft.com/office/powerpoint/2010/main" val="3611890793"/>
       </p:ext>
     </p:extLst>
   </p:cSld>
@@ -9041,6 +11777,76 @@
               <a:t>Quick Intro</a:t>
             </a:r>
             <a:endParaRPr lang="en-CA" dirty="0"/>
+          </a:p>
+        </p:txBody>
+      </p:sp>
+      <p:sp>
+        <p:nvSpPr>
+          <p:cNvPr id="2" name="Date Placeholder 1"/>
+          <p:cNvSpPr>
+            <a:spLocks noGrp="1"/>
+          </p:cNvSpPr>
+          <p:nvPr>
+            <p:ph type="dt" sz="half" idx="10"/>
+          </p:nvPr>
+        </p:nvSpPr>
+        <p:spPr/>
+        <p:txBody>
+          <a:bodyPr/>
+          <a:lstStyle/>
+          <a:p>
+            <a:fld id="{2A0CD629-440C-4771-A495-46076E79A9E7}" type="datetime1">
+              <a:rPr lang="en-US" smtClean="0"/>
+              <a:t>5/22/2012</a:t>
+            </a:fld>
+            <a:endParaRPr lang="en-US"/>
+          </a:p>
+        </p:txBody>
+      </p:sp>
+      <p:sp>
+        <p:nvSpPr>
+          <p:cNvPr id="3" name="Footer Placeholder 2"/>
+          <p:cNvSpPr>
+            <a:spLocks noGrp="1"/>
+          </p:cNvSpPr>
+          <p:nvPr>
+            <p:ph type="ftr" sz="quarter" idx="11"/>
+          </p:nvPr>
+        </p:nvSpPr>
+        <p:spPr/>
+        <p:txBody>
+          <a:bodyPr/>
+          <a:lstStyle/>
+          <a:p>
+            <a:r>
+              <a:rPr lang="en-US" smtClean="0"/>
+              <a:t>(c) 2012 HL7 International</a:t>
+            </a:r>
+            <a:endParaRPr lang="en-US"/>
+          </a:p>
+        </p:txBody>
+      </p:sp>
+      <p:sp>
+        <p:nvSpPr>
+          <p:cNvPr id="4" name="Slide Number Placeholder 3"/>
+          <p:cNvSpPr>
+            <a:spLocks noGrp="1"/>
+          </p:cNvSpPr>
+          <p:nvPr>
+            <p:ph type="sldNum" sz="quarter" idx="12"/>
+          </p:nvPr>
+        </p:nvSpPr>
+        <p:spPr/>
+        <p:txBody>
+          <a:bodyPr/>
+          <a:lstStyle/>
+          <a:p>
+            <a:fld id="{990B41CA-569D-40E7-8E58-026C0338B2C8}" type="slidenum">
+              <a:rPr lang="en-US" smtClean="0"/>
+              <a:pPr/>
+              <a:t>5</a:t>
+            </a:fld>
+            <a:endParaRPr lang="en-US"/>
           </a:p>
         </p:txBody>
       </p:sp>
@@ -9117,8 +11923,16 @@
             <a:pPr lvl="0"/>
             <a:r>
               <a:rPr lang="en-US" dirty="0" smtClean="0"/>
-              <a:t>Essentially HL7 v4</a:t>
-            </a:r>
+              <a:t>As significant as leap from v2 to v3</a:t>
+            </a:r>
+          </a:p>
+          <a:p>
+            <a:pPr lvl="1"/>
+            <a:r>
+              <a:rPr lang="en-US" dirty="0" smtClean="0"/>
+              <a:t>Still leverage v3 infrastructure &amp; knowledge</a:t>
+            </a:r>
+            <a:endParaRPr lang="en-US" dirty="0" smtClean="0"/>
           </a:p>
           <a:p>
             <a:pPr lvl="0"/>
@@ -9183,6 +11997,52 @@
               <a:t>6</a:t>
             </a:fld>
             <a:endParaRPr lang="en-CA" dirty="0"/>
+          </a:p>
+        </p:txBody>
+      </p:sp>
+      <p:sp>
+        <p:nvSpPr>
+          <p:cNvPr id="5" name="Date Placeholder 4"/>
+          <p:cNvSpPr>
+            <a:spLocks noGrp="1"/>
+          </p:cNvSpPr>
+          <p:nvPr>
+            <p:ph type="dt" sz="half" idx="10"/>
+          </p:nvPr>
+        </p:nvSpPr>
+        <p:spPr/>
+        <p:txBody>
+          <a:bodyPr/>
+          <a:lstStyle/>
+          <a:p>
+            <a:fld id="{A5BD0E8C-75C2-4E04-89AA-E3EFBB4742E9}" type="datetime1">
+              <a:rPr lang="en-US" smtClean="0"/>
+              <a:t>5/22/2012</a:t>
+            </a:fld>
+            <a:endParaRPr lang="en-US"/>
+          </a:p>
+        </p:txBody>
+      </p:sp>
+      <p:sp>
+        <p:nvSpPr>
+          <p:cNvPr id="6" name="Footer Placeholder 5"/>
+          <p:cNvSpPr>
+            <a:spLocks noGrp="1"/>
+          </p:cNvSpPr>
+          <p:nvPr>
+            <p:ph type="ftr" sz="quarter" idx="11"/>
+          </p:nvPr>
+        </p:nvSpPr>
+        <p:spPr/>
+        <p:txBody>
+          <a:bodyPr/>
+          <a:lstStyle/>
+          <a:p>
+            <a:r>
+              <a:rPr lang="en-US" smtClean="0"/>
+              <a:t>(c) 2012 HL7 International</a:t>
+            </a:r>
+            <a:endParaRPr lang="en-US" dirty="0"/>
           </a:p>
         </p:txBody>
       </p:sp>
@@ -9281,6 +12141,76 @@
           </a:p>
         </p:txBody>
       </p:sp>
+      <p:sp>
+        <p:nvSpPr>
+          <p:cNvPr id="4" name="Date Placeholder 3"/>
+          <p:cNvSpPr>
+            <a:spLocks noGrp="1"/>
+          </p:cNvSpPr>
+          <p:nvPr>
+            <p:ph type="dt" sz="half" idx="10"/>
+          </p:nvPr>
+        </p:nvSpPr>
+        <p:spPr/>
+        <p:txBody>
+          <a:bodyPr/>
+          <a:lstStyle/>
+          <a:p>
+            <a:fld id="{8EB11799-0D65-49C1-ACB6-7F78AE0DE8FA}" type="datetime1">
+              <a:rPr lang="en-US" smtClean="0"/>
+              <a:t>5/22/2012</a:t>
+            </a:fld>
+            <a:endParaRPr lang="en-US"/>
+          </a:p>
+        </p:txBody>
+      </p:sp>
+      <p:sp>
+        <p:nvSpPr>
+          <p:cNvPr id="5" name="Footer Placeholder 4"/>
+          <p:cNvSpPr>
+            <a:spLocks noGrp="1"/>
+          </p:cNvSpPr>
+          <p:nvPr>
+            <p:ph type="ftr" sz="quarter" idx="11"/>
+          </p:nvPr>
+        </p:nvSpPr>
+        <p:spPr/>
+        <p:txBody>
+          <a:bodyPr/>
+          <a:lstStyle/>
+          <a:p>
+            <a:r>
+              <a:rPr lang="en-US" smtClean="0"/>
+              <a:t>(c) 2012 HL7 International</a:t>
+            </a:r>
+            <a:endParaRPr lang="en-US" dirty="0"/>
+          </a:p>
+        </p:txBody>
+      </p:sp>
+      <p:sp>
+        <p:nvSpPr>
+          <p:cNvPr id="6" name="Slide Number Placeholder 5"/>
+          <p:cNvSpPr>
+            <a:spLocks noGrp="1"/>
+          </p:cNvSpPr>
+          <p:nvPr>
+            <p:ph type="sldNum" sz="quarter" idx="12"/>
+          </p:nvPr>
+        </p:nvSpPr>
+        <p:spPr/>
+        <p:txBody>
+          <a:bodyPr/>
+          <a:lstStyle/>
+          <a:p>
+            <a:fld id="{990B41CA-569D-40E7-8E58-026C0338B2C8}" type="slidenum">
+              <a:rPr lang="en-US" smtClean="0"/>
+              <a:pPr/>
+              <a:t>7</a:t>
+            </a:fld>
+            <a:endParaRPr lang="en-US"/>
+          </a:p>
+        </p:txBody>
+      </p:sp>
     </p:spTree>
     <p:extLst>
       <p:ext uri="{BB962C8B-B14F-4D97-AF65-F5344CB8AC3E}">
@@ -9334,6 +12264,76 @@
           </a:p>
         </p:txBody>
       </p:sp>
+      <p:sp>
+        <p:nvSpPr>
+          <p:cNvPr id="2" name="Date Placeholder 1"/>
+          <p:cNvSpPr>
+            <a:spLocks noGrp="1"/>
+          </p:cNvSpPr>
+          <p:nvPr>
+            <p:ph type="dt" sz="half" idx="10"/>
+          </p:nvPr>
+        </p:nvSpPr>
+        <p:spPr/>
+        <p:txBody>
+          <a:bodyPr/>
+          <a:lstStyle/>
+          <a:p>
+            <a:fld id="{810B8628-35F9-49B1-88A9-61BF20E7638D}" type="datetime1">
+              <a:rPr lang="en-US" smtClean="0"/>
+              <a:t>5/22/2012</a:t>
+            </a:fld>
+            <a:endParaRPr lang="en-US"/>
+          </a:p>
+        </p:txBody>
+      </p:sp>
+      <p:sp>
+        <p:nvSpPr>
+          <p:cNvPr id="3" name="Footer Placeholder 2"/>
+          <p:cNvSpPr>
+            <a:spLocks noGrp="1"/>
+          </p:cNvSpPr>
+          <p:nvPr>
+            <p:ph type="ftr" sz="quarter" idx="11"/>
+          </p:nvPr>
+        </p:nvSpPr>
+        <p:spPr/>
+        <p:txBody>
+          <a:bodyPr/>
+          <a:lstStyle/>
+          <a:p>
+            <a:r>
+              <a:rPr lang="en-US" smtClean="0"/>
+              <a:t>(c) 2012 HL7 International</a:t>
+            </a:r>
+            <a:endParaRPr lang="en-US"/>
+          </a:p>
+        </p:txBody>
+      </p:sp>
+      <p:sp>
+        <p:nvSpPr>
+          <p:cNvPr id="4" name="Slide Number Placeholder 3"/>
+          <p:cNvSpPr>
+            <a:spLocks noGrp="1"/>
+          </p:cNvSpPr>
+          <p:nvPr>
+            <p:ph type="sldNum" sz="quarter" idx="12"/>
+          </p:nvPr>
+        </p:nvSpPr>
+        <p:spPr/>
+        <p:txBody>
+          <a:bodyPr/>
+          <a:lstStyle/>
+          <a:p>
+            <a:fld id="{990B41CA-569D-40E7-8E58-026C0338B2C8}" type="slidenum">
+              <a:rPr lang="en-US" smtClean="0"/>
+              <a:pPr/>
+              <a:t>8</a:t>
+            </a:fld>
+            <a:endParaRPr lang="en-US"/>
+          </a:p>
+        </p:txBody>
+      </p:sp>
     </p:spTree>
     <p:extLst>
       <p:ext uri="{BB962C8B-B14F-4D97-AF65-F5344CB8AC3E}">
@@ -9434,6 +12434,76 @@
               <a:t>TSC will help set priorities</a:t>
             </a:r>
             <a:endParaRPr lang="en-CA" dirty="0"/>
+          </a:p>
+        </p:txBody>
+      </p:sp>
+      <p:sp>
+        <p:nvSpPr>
+          <p:cNvPr id="4" name="Date Placeholder 3"/>
+          <p:cNvSpPr>
+            <a:spLocks noGrp="1"/>
+          </p:cNvSpPr>
+          <p:nvPr>
+            <p:ph type="dt" sz="half" idx="10"/>
+          </p:nvPr>
+        </p:nvSpPr>
+        <p:spPr/>
+        <p:txBody>
+          <a:bodyPr/>
+          <a:lstStyle/>
+          <a:p>
+            <a:fld id="{A3861920-25E2-4FA8-8F10-A23D5E6FF52D}" type="datetime1">
+              <a:rPr lang="en-US" smtClean="0"/>
+              <a:t>5/22/2012</a:t>
+            </a:fld>
+            <a:endParaRPr lang="en-US"/>
+          </a:p>
+        </p:txBody>
+      </p:sp>
+      <p:sp>
+        <p:nvSpPr>
+          <p:cNvPr id="5" name="Footer Placeholder 4"/>
+          <p:cNvSpPr>
+            <a:spLocks noGrp="1"/>
+          </p:cNvSpPr>
+          <p:nvPr>
+            <p:ph type="ftr" sz="quarter" idx="11"/>
+          </p:nvPr>
+        </p:nvSpPr>
+        <p:spPr/>
+        <p:txBody>
+          <a:bodyPr/>
+          <a:lstStyle/>
+          <a:p>
+            <a:r>
+              <a:rPr lang="en-US" smtClean="0"/>
+              <a:t>(c) 2012 HL7 International</a:t>
+            </a:r>
+            <a:endParaRPr lang="en-US" dirty="0"/>
+          </a:p>
+        </p:txBody>
+      </p:sp>
+      <p:sp>
+        <p:nvSpPr>
+          <p:cNvPr id="6" name="Slide Number Placeholder 5"/>
+          <p:cNvSpPr>
+            <a:spLocks noGrp="1"/>
+          </p:cNvSpPr>
+          <p:nvPr>
+            <p:ph type="sldNum" sz="quarter" idx="12"/>
+          </p:nvPr>
+        </p:nvSpPr>
+        <p:spPr/>
+        <p:txBody>
+          <a:bodyPr/>
+          <a:lstStyle/>
+          <a:p>
+            <a:fld id="{990B41CA-569D-40E7-8E58-026C0338B2C8}" type="slidenum">
+              <a:rPr lang="en-US" smtClean="0"/>
+              <a:pPr/>
+              <a:t>9</a:t>
+            </a:fld>
+            <a:endParaRPr lang="en-US"/>
           </a:p>
         </p:txBody>
       </p:sp>

</xml_diff>